<commit_message>
q - to start, e - to reset
</commit_message>
<xml_diff>
--- a/FirstNameLastName_Planning.pptx
+++ b/FirstNameLastName_Planning.pptx
@@ -5,7 +5,7 @@
     <p:sldMasterId id="2147483648" r:id="rId1"/>
   </p:sldMasterIdLst>
   <p:notesMasterIdLst>
-    <p:notesMasterId r:id="rId26"/>
+    <p:notesMasterId r:id="rId27"/>
   </p:notesMasterIdLst>
   <p:sldIdLst>
     <p:sldId id="256" r:id="rId2"/>
@@ -18,20 +18,21 @@
     <p:sldId id="294" r:id="rId9"/>
     <p:sldId id="295" r:id="rId10"/>
     <p:sldId id="296" r:id="rId11"/>
-    <p:sldId id="298" r:id="rId12"/>
-    <p:sldId id="297" r:id="rId13"/>
-    <p:sldId id="301" r:id="rId14"/>
-    <p:sldId id="300" r:id="rId15"/>
-    <p:sldId id="290" r:id="rId16"/>
-    <p:sldId id="280" r:id="rId17"/>
-    <p:sldId id="281" r:id="rId18"/>
-    <p:sldId id="282" r:id="rId19"/>
-    <p:sldId id="283" r:id="rId20"/>
-    <p:sldId id="284" r:id="rId21"/>
-    <p:sldId id="285" r:id="rId22"/>
-    <p:sldId id="286" r:id="rId23"/>
-    <p:sldId id="287" r:id="rId24"/>
-    <p:sldId id="269" r:id="rId25"/>
+    <p:sldId id="304" r:id="rId12"/>
+    <p:sldId id="298" r:id="rId13"/>
+    <p:sldId id="297" r:id="rId14"/>
+    <p:sldId id="301" r:id="rId15"/>
+    <p:sldId id="300" r:id="rId16"/>
+    <p:sldId id="290" r:id="rId17"/>
+    <p:sldId id="280" r:id="rId18"/>
+    <p:sldId id="281" r:id="rId19"/>
+    <p:sldId id="282" r:id="rId20"/>
+    <p:sldId id="283" r:id="rId21"/>
+    <p:sldId id="284" r:id="rId22"/>
+    <p:sldId id="285" r:id="rId23"/>
+    <p:sldId id="286" r:id="rId24"/>
+    <p:sldId id="287" r:id="rId25"/>
+    <p:sldId id="269" r:id="rId26"/>
   </p:sldIdLst>
   <p:sldSz cx="12192000" cy="6858000"/>
   <p:notesSz cx="6858000" cy="9144000"/>
@@ -220,7 +221,7 @@
           <a:p>
             <a:fld id="{57789014-B0AA-4E7E-BB0D-3C010066DA41}" type="datetimeFigureOut">
               <a:rPr lang="en-US" smtClean="0"/>
-              <a:t>4/7/2021</a:t>
+              <a:t>4/8/2021</a:t>
             </a:fld>
             <a:endParaRPr lang="en-US"/>
           </a:p>
@@ -533,16 +534,21 @@
           <a:p>
             <a:r>
               <a:rPr lang="en-US" dirty="0"/>
-              <a:t>1. Because HTNs are forward searching there is no way to set an end goal. They just respond to the </a:t>
+              <a:t>Planning takes a lot of time so, demo needs to be short to account for planning </a:t>
             </a:r>
             <a:r>
               <a:rPr lang="en-US" dirty="0" err="1"/>
-              <a:t>everntment</a:t>
+              <a:t>pragmming</a:t>
             </a:r>
             <a:r>
               <a:rPr lang="en-US" dirty="0"/>
-              <a:t> and don’t care what will happen</a:t>
-            </a:r>
+              <a:t> </a:t>
+            </a:r>
+            <a:r>
+              <a:rPr lang="en-US" dirty="0" err="1"/>
+              <a:t>lenght</a:t>
+            </a:r>
+            <a:endParaRPr lang="en-US" dirty="0"/>
           </a:p>
         </p:txBody>
       </p:sp>
@@ -563,7 +569,7 @@
           <a:p>
             <a:fld id="{F5C1EC3F-89C9-4584-8DCD-67AB019E66E5}" type="slidenum">
               <a:rPr lang="en-US" smtClean="0"/>
-              <a:t>6</a:t>
+              <a:t>3</a:t>
             </a:fld>
             <a:endParaRPr lang="en-US"/>
           </a:p>
@@ -572,7 +578,7 @@
     </p:spTree>
     <p:extLst>
       <p:ext uri="{BB962C8B-B14F-4D97-AF65-F5344CB8AC3E}">
-        <p14:creationId xmlns:p14="http://schemas.microsoft.com/office/powerpoint/2010/main" val="3669568664"/>
+        <p14:creationId xmlns:p14="http://schemas.microsoft.com/office/powerpoint/2010/main" val="1327334779"/>
       </p:ext>
     </p:extLst>
   </p:cSld>
@@ -626,19 +632,18 @@
           <a:bodyPr/>
           <a:lstStyle/>
           <a:p>
-            <a:pPr marL="228600" indent="-228600">
-              <a:buAutoNum type="arabicPeriod"/>
-            </a:pPr>
             <a:r>
               <a:rPr lang="en-US" dirty="0"/>
-              <a:t>Because of backtracking it is hard to keep track of its affects on the world and can become unaccreted after planning a couple of tasks. It Has to assume the world state now is what it will be when it reaches the end because it has to track backwards</a:t>
-            </a:r>
-          </a:p>
-          <a:p>
-            <a:pPr marL="228600" indent="-228600">
-              <a:buAutoNum type="arabicPeriod"/>
-            </a:pPr>
-            <a:endParaRPr lang="en-US" dirty="0"/>
+              <a:t>1. Because HTNs are forward searching there is no way to set an end goal. They just respond to the </a:t>
+            </a:r>
+            <a:r>
+              <a:rPr lang="en-US" dirty="0" err="1"/>
+              <a:t>everntment</a:t>
+            </a:r>
+            <a:r>
+              <a:rPr lang="en-US" dirty="0"/>
+              <a:t> and don’t care what will happen</a:t>
+            </a:r>
           </a:p>
         </p:txBody>
       </p:sp>
@@ -659,7 +664,7 @@
           <a:p>
             <a:fld id="{F5C1EC3F-89C9-4584-8DCD-67AB019E66E5}" type="slidenum">
               <a:rPr lang="en-US" smtClean="0"/>
-              <a:t>9</a:t>
+              <a:t>6</a:t>
             </a:fld>
             <a:endParaRPr lang="en-US"/>
           </a:p>
@@ -668,7 +673,7 @@
     </p:spTree>
     <p:extLst>
       <p:ext uri="{BB962C8B-B14F-4D97-AF65-F5344CB8AC3E}">
-        <p14:creationId xmlns:p14="http://schemas.microsoft.com/office/powerpoint/2010/main" val="3588742906"/>
+        <p14:creationId xmlns:p14="http://schemas.microsoft.com/office/powerpoint/2010/main" val="3669568664"/>
       </p:ext>
     </p:extLst>
   </p:cSld>
@@ -722,10 +727,19 @@
           <a:bodyPr/>
           <a:lstStyle/>
           <a:p>
+            <a:pPr marL="228600" indent="-228600">
+              <a:buAutoNum type="arabicPeriod"/>
+            </a:pPr>
             <a:r>
               <a:rPr lang="en-US" dirty="0"/>
-              <a:t>Operation borrowed from HTN</a:t>
-            </a:r>
+              <a:t>Because of backtracking it is hard to keep track of its affects on the world and can become unaccreted after planning a couple of tasks. It Has to assume the world state now is what it will be when it reaches the end because it has to track backwards. Might have to make guess about the starting state of a task</a:t>
+            </a:r>
+          </a:p>
+          <a:p>
+            <a:pPr marL="228600" indent="-228600">
+              <a:buAutoNum type="arabicPeriod"/>
+            </a:pPr>
+            <a:endParaRPr lang="en-US" dirty="0"/>
           </a:p>
         </p:txBody>
       </p:sp>
@@ -746,7 +760,94 @@
           <a:p>
             <a:fld id="{F5C1EC3F-89C9-4584-8DCD-67AB019E66E5}" type="slidenum">
               <a:rPr lang="en-US" smtClean="0"/>
-              <a:t>11</a:t>
+              <a:t>9</a:t>
+            </a:fld>
+            <a:endParaRPr lang="en-US"/>
+          </a:p>
+        </p:txBody>
+      </p:sp>
+    </p:spTree>
+    <p:extLst>
+      <p:ext uri="{BB962C8B-B14F-4D97-AF65-F5344CB8AC3E}">
+        <p14:creationId xmlns:p14="http://schemas.microsoft.com/office/powerpoint/2010/main" val="3588742906"/>
+      </p:ext>
+    </p:extLst>
+  </p:cSld>
+  <p:clrMapOvr>
+    <a:masterClrMapping/>
+  </p:clrMapOvr>
+</p:notes>
+</file>
+
+<file path=ppt/notesSlides/notesSlide4.xml><?xml version="1.0" encoding="utf-8"?>
+<p:notes xmlns:a="http://schemas.openxmlformats.org/drawingml/2006/main" xmlns:r="http://schemas.openxmlformats.org/officeDocument/2006/relationships" xmlns:p="http://schemas.openxmlformats.org/presentationml/2006/main">
+  <p:cSld>
+    <p:spTree>
+      <p:nvGrpSpPr>
+        <p:cNvPr id="1" name=""/>
+        <p:cNvGrpSpPr/>
+        <p:nvPr/>
+      </p:nvGrpSpPr>
+      <p:grpSpPr>
+        <a:xfrm>
+          <a:off x="0" y="0"/>
+          <a:ext cx="0" cy="0"/>
+          <a:chOff x="0" y="0"/>
+          <a:chExt cx="0" cy="0"/>
+        </a:xfrm>
+      </p:grpSpPr>
+      <p:sp>
+        <p:nvSpPr>
+          <p:cNvPr id="2" name="Slide Image Placeholder 1"/>
+          <p:cNvSpPr>
+            <a:spLocks noGrp="1" noRot="1" noChangeAspect="1"/>
+          </p:cNvSpPr>
+          <p:nvPr>
+            <p:ph type="sldImg"/>
+          </p:nvPr>
+        </p:nvSpPr>
+        <p:spPr/>
+      </p:sp>
+      <p:sp>
+        <p:nvSpPr>
+          <p:cNvPr id="3" name="Notes Placeholder 2"/>
+          <p:cNvSpPr>
+            <a:spLocks noGrp="1"/>
+          </p:cNvSpPr>
+          <p:nvPr>
+            <p:ph type="body" idx="1"/>
+          </p:nvPr>
+        </p:nvSpPr>
+        <p:spPr/>
+        <p:txBody>
+          <a:bodyPr/>
+          <a:lstStyle/>
+          <a:p>
+            <a:r>
+              <a:rPr lang="en-US" dirty="0"/>
+              <a:t>Operation borrowed from HTN</a:t>
+            </a:r>
+          </a:p>
+        </p:txBody>
+      </p:sp>
+      <p:sp>
+        <p:nvSpPr>
+          <p:cNvPr id="4" name="Slide Number Placeholder 3"/>
+          <p:cNvSpPr>
+            <a:spLocks noGrp="1"/>
+          </p:cNvSpPr>
+          <p:nvPr>
+            <p:ph type="sldNum" sz="quarter" idx="5"/>
+          </p:nvPr>
+        </p:nvSpPr>
+        <p:spPr/>
+        <p:txBody>
+          <a:bodyPr/>
+          <a:lstStyle/>
+          <a:p>
+            <a:fld id="{F5C1EC3F-89C9-4584-8DCD-67AB019E66E5}" type="slidenum">
+              <a:rPr lang="en-US" smtClean="0"/>
+              <a:t>12</a:t>
             </a:fld>
             <a:endParaRPr lang="en-US"/>
           </a:p>
@@ -4848,6 +4949,209 @@
 </file>
 
 <file path=ppt/slides/slide11.xml><?xml version="1.0" encoding="utf-8"?>
+<p:sld xmlns:a="http://schemas.openxmlformats.org/drawingml/2006/main" xmlns:r="http://schemas.openxmlformats.org/officeDocument/2006/relationships" xmlns:p="http://schemas.openxmlformats.org/presentationml/2006/main">
+  <p:cSld>
+    <p:spTree>
+      <p:nvGrpSpPr>
+        <p:cNvPr id="1" name=""/>
+        <p:cNvGrpSpPr/>
+        <p:nvPr/>
+      </p:nvGrpSpPr>
+      <p:grpSpPr>
+        <a:xfrm>
+          <a:off x="0" y="0"/>
+          <a:ext cx="0" cy="0"/>
+          <a:chOff x="0" y="0"/>
+          <a:chExt cx="0" cy="0"/>
+        </a:xfrm>
+      </p:grpSpPr>
+      <p:sp>
+        <p:nvSpPr>
+          <p:cNvPr id="2" name="Content Placeholder 1"/>
+          <p:cNvSpPr>
+            <a:spLocks noGrp="1"/>
+          </p:cNvSpPr>
+          <p:nvPr>
+            <p:ph idx="1"/>
+          </p:nvPr>
+        </p:nvSpPr>
+        <p:spPr/>
+        <p:txBody>
+          <a:bodyPr/>
+          <a:lstStyle/>
+          <a:p>
+            <a:endParaRPr lang="en-US" dirty="0"/>
+          </a:p>
+        </p:txBody>
+      </p:sp>
+      <p:sp>
+        <p:nvSpPr>
+          <p:cNvPr id="3" name="Content Placeholder 2"/>
+          <p:cNvSpPr>
+            <a:spLocks noGrp="1"/>
+          </p:cNvSpPr>
+          <p:nvPr>
+            <p:ph idx="10"/>
+          </p:nvPr>
+        </p:nvSpPr>
+        <p:spPr/>
+        <p:txBody>
+          <a:bodyPr>
+            <a:noAutofit/>
+          </a:bodyPr>
+          <a:lstStyle/>
+          <a:p>
+            <a:pPr>
+              <a:buClr>
+                <a:schemeClr val="accent2"/>
+              </a:buClr>
+            </a:pPr>
+            <a:r>
+              <a:rPr lang="en-US" dirty="0"/>
+              <a:t>All the possible </a:t>
+            </a:r>
+            <a:r>
+              <a:rPr lang="en-US" dirty="0">
+                <a:solidFill>
+                  <a:schemeClr val="accent2"/>
+                </a:solidFill>
+              </a:rPr>
+              <a:t>tasks</a:t>
+            </a:r>
+            <a:r>
+              <a:rPr lang="en-US" dirty="0"/>
+              <a:t> in our demo</a:t>
+            </a:r>
+          </a:p>
+        </p:txBody>
+      </p:sp>
+      <p:pic>
+        <p:nvPicPr>
+          <p:cNvPr id="5" name="Picture 4">
+            <a:extLst>
+              <a:ext uri="{FF2B5EF4-FFF2-40B4-BE49-F238E27FC236}">
+                <a16:creationId xmlns:a16="http://schemas.microsoft.com/office/drawing/2014/main" id="{50CCB183-77C8-4871-A67C-E9A337BFEC07}"/>
+              </a:ext>
+            </a:extLst>
+          </p:cNvPr>
+          <p:cNvPicPr>
+            <a:picLocks noChangeAspect="1"/>
+          </p:cNvPicPr>
+          <p:nvPr/>
+        </p:nvPicPr>
+        <p:blipFill>
+          <a:blip r:embed="rId2"/>
+          <a:stretch>
+            <a:fillRect/>
+          </a:stretch>
+        </p:blipFill>
+        <p:spPr>
+          <a:xfrm>
+            <a:off x="4415644" y="1899880"/>
+            <a:ext cx="3360711" cy="4450466"/>
+          </a:xfrm>
+          <a:prstGeom prst="rect">
+            <a:avLst/>
+          </a:prstGeom>
+        </p:spPr>
+      </p:pic>
+    </p:spTree>
+    <p:extLst>
+      <p:ext uri="{BB962C8B-B14F-4D97-AF65-F5344CB8AC3E}">
+        <p14:creationId xmlns:p14="http://schemas.microsoft.com/office/powerpoint/2010/main" val="2187089509"/>
+      </p:ext>
+    </p:extLst>
+  </p:cSld>
+  <p:clrMapOvr>
+    <a:masterClrMapping/>
+  </p:clrMapOvr>
+  <p:timing>
+    <p:tnLst>
+      <p:par>
+        <p:cTn id="1" dur="indefinite" restart="never" nodeType="tmRoot">
+          <p:childTnLst>
+            <p:seq concurrent="1" nextAc="seek">
+              <p:cTn id="2" dur="indefinite" nodeType="mainSeq">
+                <p:childTnLst>
+                  <p:par>
+                    <p:cTn id="3" fill="hold">
+                      <p:stCondLst>
+                        <p:cond delay="indefinite"/>
+                      </p:stCondLst>
+                      <p:childTnLst>
+                        <p:par>
+                          <p:cTn id="4" fill="hold">
+                            <p:stCondLst>
+                              <p:cond delay="0"/>
+                            </p:stCondLst>
+                            <p:childTnLst>
+                              <p:par>
+                                <p:cTn id="5" presetID="10" presetClass="entr" presetSubtype="0" fill="hold" nodeType="clickEffect">
+                                  <p:stCondLst>
+                                    <p:cond delay="0"/>
+                                  </p:stCondLst>
+                                  <p:childTnLst>
+                                    <p:set>
+                                      <p:cBhvr>
+                                        <p:cTn id="6" dur="1" fill="hold">
+                                          <p:stCondLst>
+                                            <p:cond delay="0"/>
+                                          </p:stCondLst>
+                                        </p:cTn>
+                                        <p:tgtEl>
+                                          <p:spTgt spid="5"/>
+                                        </p:tgtEl>
+                                        <p:attrNameLst>
+                                          <p:attrName>style.visibility</p:attrName>
+                                        </p:attrNameLst>
+                                      </p:cBhvr>
+                                      <p:to>
+                                        <p:strVal val="visible"/>
+                                      </p:to>
+                                    </p:set>
+                                    <p:animEffect transition="in" filter="fade">
+                                      <p:cBhvr>
+                                        <p:cTn id="7" dur="500"/>
+                                        <p:tgtEl>
+                                          <p:spTgt spid="5"/>
+                                        </p:tgtEl>
+                                      </p:cBhvr>
+                                    </p:animEffect>
+                                  </p:childTnLst>
+                                </p:cTn>
+                              </p:par>
+                            </p:childTnLst>
+                          </p:cTn>
+                        </p:par>
+                      </p:childTnLst>
+                    </p:cTn>
+                  </p:par>
+                </p:childTnLst>
+              </p:cTn>
+              <p:prevCondLst>
+                <p:cond evt="onPrev" delay="0">
+                  <p:tgtEl>
+                    <p:sldTgt/>
+                  </p:tgtEl>
+                </p:cond>
+              </p:prevCondLst>
+              <p:nextCondLst>
+                <p:cond evt="onNext" delay="0">
+                  <p:tgtEl>
+                    <p:sldTgt/>
+                  </p:tgtEl>
+                </p:cond>
+              </p:nextCondLst>
+            </p:seq>
+          </p:childTnLst>
+        </p:cTn>
+      </p:par>
+    </p:tnLst>
+  </p:timing>
+</p:sld>
+</file>
+
+<file path=ppt/slides/slide12.xml><?xml version="1.0" encoding="utf-8"?>
 <p:sld xmlns:a="http://schemas.openxmlformats.org/drawingml/2006/main" xmlns:r="http://schemas.openxmlformats.org/officeDocument/2006/relationships" xmlns:p="http://schemas.openxmlformats.org/presentationml/2006/main">
   <p:cSld>
     <p:spTree>
@@ -6235,7 +6539,7 @@
 </p:sld>
 </file>
 
-<file path=ppt/slides/slide12.xml><?xml version="1.0" encoding="utf-8"?>
+<file path=ppt/slides/slide13.xml><?xml version="1.0" encoding="utf-8"?>
 <p:sld xmlns:a="http://schemas.openxmlformats.org/drawingml/2006/main" xmlns:r="http://schemas.openxmlformats.org/officeDocument/2006/relationships" xmlns:p="http://schemas.openxmlformats.org/presentationml/2006/main">
   <p:cSld>
     <p:spTree>
@@ -7164,7 +7468,7 @@
 </p:sld>
 </file>
 
-<file path=ppt/slides/slide13.xml><?xml version="1.0" encoding="utf-8"?>
+<file path=ppt/slides/slide14.xml><?xml version="1.0" encoding="utf-8"?>
 <p:sld xmlns:a="http://schemas.openxmlformats.org/drawingml/2006/main" xmlns:r="http://schemas.openxmlformats.org/officeDocument/2006/relationships" xmlns:p="http://schemas.openxmlformats.org/presentationml/2006/main">
   <p:cSld>
     <p:spTree>
@@ -7283,7 +7587,7 @@
                   </a:schemeClr>
                 </a:solidFill>
               </a:rPr>
-              <a:t>Unmeet preconditions</a:t>
+              <a:t>Unmet preconditions</a:t>
             </a:r>
           </a:p>
           <a:p>
@@ -7300,7 +7604,7 @@
                   </a:schemeClr>
                 </a:solidFill>
               </a:rPr>
-              <a:t>Amount of goals left uncompleted</a:t>
+              <a:t>Number of goals left uncompleted</a:t>
             </a:r>
           </a:p>
           <a:p>
@@ -7534,7 +7838,7 @@
 </p:sld>
 </file>
 
-<file path=ppt/slides/slide14.xml><?xml version="1.0" encoding="utf-8"?>
+<file path=ppt/slides/slide15.xml><?xml version="1.0" encoding="utf-8"?>
 <p:sld xmlns:a="http://schemas.openxmlformats.org/drawingml/2006/main" xmlns:r="http://schemas.openxmlformats.org/officeDocument/2006/relationships" xmlns:p="http://schemas.openxmlformats.org/presentationml/2006/main">
   <p:cSld>
     <p:spTree>
@@ -7571,39 +7875,8 @@
           <a:p>
             <a:r>
               <a:rPr lang="en-US" dirty="0"/>
-              <a:t>Minimize your use of text</a:t>
-            </a:r>
-          </a:p>
-          <a:p>
-            <a:pPr marL="1143000" lvl="1" indent="-457200"/>
-            <a:r>
-              <a:rPr lang="en-US" dirty="0"/>
-              <a:t>Use bullets sparingly (better to just say it)</a:t>
-            </a:r>
-          </a:p>
-          <a:p>
-            <a:pPr marL="1143000" lvl="1" indent="-457200"/>
-            <a:r>
-              <a:rPr lang="en-US" dirty="0"/>
-              <a:t>Minimize the “noise” on each slide</a:t>
-            </a:r>
-          </a:p>
-          <a:p>
-            <a:pPr marL="1143000" lvl="1" indent="-457200"/>
-            <a:r>
-              <a:rPr lang="en-US" dirty="0"/>
-              <a:t>No one wants to read your presentation</a:t>
-            </a:r>
-          </a:p>
-          <a:p>
-            <a:pPr marL="1143000" lvl="1" indent="-457200"/>
-            <a:r>
-              <a:rPr lang="en-US" dirty="0"/>
-              <a:t>Use “effective redundancy” and let your slides add value in addition to what you say</a:t>
-            </a:r>
-          </a:p>
-          <a:p>
-            <a:endParaRPr lang="en-US" dirty="0"/>
+              <a:t>Find a way to get invertible tasks consistently</a:t>
+            </a:r>
           </a:p>
         </p:txBody>
       </p:sp>
@@ -7661,7 +7934,7 @@
 </p:sld>
 </file>
 
-<file path=ppt/slides/slide15.xml><?xml version="1.0" encoding="utf-8"?>
+<file path=ppt/slides/slide16.xml><?xml version="1.0" encoding="utf-8"?>
 <p:sld xmlns:a="http://schemas.openxmlformats.org/drawingml/2006/main" xmlns:r="http://schemas.openxmlformats.org/officeDocument/2006/relationships" xmlns:p="http://schemas.openxmlformats.org/presentationml/2006/main">
   <p:cSld>
     <p:spTree>
@@ -7789,114 +8062,6 @@
     <p:extLst>
       <p:ext uri="{BB962C8B-B14F-4D97-AF65-F5344CB8AC3E}">
         <p14:creationId xmlns:p14="http://schemas.microsoft.com/office/powerpoint/2010/main" val="159131091"/>
-      </p:ext>
-    </p:extLst>
-  </p:cSld>
-  <p:clrMapOvr>
-    <a:masterClrMapping/>
-  </p:clrMapOvr>
-</p:sld>
-</file>
-
-<file path=ppt/slides/slide16.xml><?xml version="1.0" encoding="utf-8"?>
-<p:sld xmlns:a="http://schemas.openxmlformats.org/drawingml/2006/main" xmlns:r="http://schemas.openxmlformats.org/officeDocument/2006/relationships" xmlns:p="http://schemas.openxmlformats.org/presentationml/2006/main">
-  <p:cSld>
-    <p:spTree>
-      <p:nvGrpSpPr>
-        <p:cNvPr id="1" name=""/>
-        <p:cNvGrpSpPr/>
-        <p:nvPr/>
-      </p:nvGrpSpPr>
-      <p:grpSpPr>
-        <a:xfrm>
-          <a:off x="0" y="0"/>
-          <a:ext cx="0" cy="0"/>
-          <a:chOff x="0" y="0"/>
-          <a:chExt cx="0" cy="0"/>
-        </a:xfrm>
-      </p:grpSpPr>
-      <p:sp>
-        <p:nvSpPr>
-          <p:cNvPr id="2" name="Content Placeholder 1"/>
-          <p:cNvSpPr>
-            <a:spLocks noGrp="1"/>
-          </p:cNvSpPr>
-          <p:nvPr>
-            <p:ph idx="1"/>
-          </p:nvPr>
-        </p:nvSpPr>
-        <p:spPr/>
-        <p:txBody>
-          <a:bodyPr/>
-          <a:lstStyle/>
-          <a:p>
-            <a:endParaRPr lang="en-US" dirty="0"/>
-          </a:p>
-          <a:p>
-            <a:r>
-              <a:rPr lang="en-US" dirty="0"/>
-              <a:t>Minimize your use of text</a:t>
-            </a:r>
-          </a:p>
-          <a:p>
-            <a:pPr marL="1143000" lvl="1" indent="-457200"/>
-            <a:r>
-              <a:rPr lang="en-US" dirty="0"/>
-              <a:t>Use bullets sparingly (better to just say it)</a:t>
-            </a:r>
-          </a:p>
-          <a:p>
-            <a:pPr marL="1143000" lvl="1" indent="-457200"/>
-            <a:r>
-              <a:rPr lang="en-US" dirty="0"/>
-              <a:t>Minimize the “noise” on each slide</a:t>
-            </a:r>
-          </a:p>
-          <a:p>
-            <a:pPr marL="1143000" lvl="1" indent="-457200"/>
-            <a:r>
-              <a:rPr lang="en-US" dirty="0"/>
-              <a:t>No one wants to read your presentation</a:t>
-            </a:r>
-          </a:p>
-          <a:p>
-            <a:pPr marL="1143000" lvl="1" indent="-457200"/>
-            <a:r>
-              <a:rPr lang="en-US" dirty="0"/>
-              <a:t>Use “effective redundancy” and let your slides add value in addition to what you say</a:t>
-            </a:r>
-          </a:p>
-          <a:p>
-            <a:endParaRPr lang="en-US" dirty="0"/>
-          </a:p>
-        </p:txBody>
-      </p:sp>
-      <p:sp>
-        <p:nvSpPr>
-          <p:cNvPr id="3" name="Content Placeholder 2"/>
-          <p:cNvSpPr>
-            <a:spLocks noGrp="1"/>
-          </p:cNvSpPr>
-          <p:nvPr>
-            <p:ph idx="10"/>
-          </p:nvPr>
-        </p:nvSpPr>
-        <p:spPr/>
-        <p:txBody>
-          <a:bodyPr/>
-          <a:lstStyle/>
-          <a:p>
-            <a:r>
-              <a:rPr lang="en-US" dirty="0"/>
-              <a:t>Sentence that explains the point</a:t>
-            </a:r>
-          </a:p>
-        </p:txBody>
-      </p:sp>
-    </p:spTree>
-    <p:extLst>
-      <p:ext uri="{BB962C8B-B14F-4D97-AF65-F5344CB8AC3E}">
-        <p14:creationId xmlns:p14="http://schemas.microsoft.com/office/powerpoint/2010/main" val="2844394451"/>
       </p:ext>
     </p:extLst>
   </p:cSld>
@@ -7935,6 +8100,114 @@
         </p:nvSpPr>
         <p:spPr/>
         <p:txBody>
+          <a:bodyPr/>
+          <a:lstStyle/>
+          <a:p>
+            <a:endParaRPr lang="en-US" dirty="0"/>
+          </a:p>
+          <a:p>
+            <a:r>
+              <a:rPr lang="en-US" dirty="0"/>
+              <a:t>Minimize your use of text</a:t>
+            </a:r>
+          </a:p>
+          <a:p>
+            <a:pPr marL="1143000" lvl="1" indent="-457200"/>
+            <a:r>
+              <a:rPr lang="en-US" dirty="0"/>
+              <a:t>Use bullets sparingly (better to just say it)</a:t>
+            </a:r>
+          </a:p>
+          <a:p>
+            <a:pPr marL="1143000" lvl="1" indent="-457200"/>
+            <a:r>
+              <a:rPr lang="en-US" dirty="0"/>
+              <a:t>Minimize the “noise” on each slide</a:t>
+            </a:r>
+          </a:p>
+          <a:p>
+            <a:pPr marL="1143000" lvl="1" indent="-457200"/>
+            <a:r>
+              <a:rPr lang="en-US" dirty="0"/>
+              <a:t>No one wants to read your presentation</a:t>
+            </a:r>
+          </a:p>
+          <a:p>
+            <a:pPr marL="1143000" lvl="1" indent="-457200"/>
+            <a:r>
+              <a:rPr lang="en-US" dirty="0"/>
+              <a:t>Use “effective redundancy” and let your slides add value in addition to what you say</a:t>
+            </a:r>
+          </a:p>
+          <a:p>
+            <a:endParaRPr lang="en-US" dirty="0"/>
+          </a:p>
+        </p:txBody>
+      </p:sp>
+      <p:sp>
+        <p:nvSpPr>
+          <p:cNvPr id="3" name="Content Placeholder 2"/>
+          <p:cNvSpPr>
+            <a:spLocks noGrp="1"/>
+          </p:cNvSpPr>
+          <p:nvPr>
+            <p:ph idx="10"/>
+          </p:nvPr>
+        </p:nvSpPr>
+        <p:spPr/>
+        <p:txBody>
+          <a:bodyPr/>
+          <a:lstStyle/>
+          <a:p>
+            <a:r>
+              <a:rPr lang="en-US" dirty="0"/>
+              <a:t>Sentence that explains the point</a:t>
+            </a:r>
+          </a:p>
+        </p:txBody>
+      </p:sp>
+    </p:spTree>
+    <p:extLst>
+      <p:ext uri="{BB962C8B-B14F-4D97-AF65-F5344CB8AC3E}">
+        <p14:creationId xmlns:p14="http://schemas.microsoft.com/office/powerpoint/2010/main" val="2844394451"/>
+      </p:ext>
+    </p:extLst>
+  </p:cSld>
+  <p:clrMapOvr>
+    <a:masterClrMapping/>
+  </p:clrMapOvr>
+</p:sld>
+</file>
+
+<file path=ppt/slides/slide18.xml><?xml version="1.0" encoding="utf-8"?>
+<p:sld xmlns:a="http://schemas.openxmlformats.org/drawingml/2006/main" xmlns:r="http://schemas.openxmlformats.org/officeDocument/2006/relationships" xmlns:p="http://schemas.openxmlformats.org/presentationml/2006/main">
+  <p:cSld>
+    <p:spTree>
+      <p:nvGrpSpPr>
+        <p:cNvPr id="1" name=""/>
+        <p:cNvGrpSpPr/>
+        <p:nvPr/>
+      </p:nvGrpSpPr>
+      <p:grpSpPr>
+        <a:xfrm>
+          <a:off x="0" y="0"/>
+          <a:ext cx="0" cy="0"/>
+          <a:chOff x="0" y="0"/>
+          <a:chExt cx="0" cy="0"/>
+        </a:xfrm>
+      </p:grpSpPr>
+      <p:sp>
+        <p:nvSpPr>
+          <p:cNvPr id="2" name="Content Placeholder 1"/>
+          <p:cNvSpPr>
+            <a:spLocks noGrp="1"/>
+          </p:cNvSpPr>
+          <p:nvPr>
+            <p:ph idx="1"/>
+          </p:nvPr>
+        </p:nvSpPr>
+        <p:spPr/>
+        <p:txBody>
           <a:bodyPr>
             <a:normAutofit lnSpcReduction="10000"/>
           </a:bodyPr>
@@ -8077,7 +8350,7 @@
 </p:sld>
 </file>
 
-<file path=ppt/slides/slide18.xml><?xml version="1.0" encoding="utf-8"?>
+<file path=ppt/slides/slide19.xml><?xml version="1.0" encoding="utf-8"?>
 <p:sld xmlns:a="http://schemas.openxmlformats.org/drawingml/2006/main" xmlns:r="http://schemas.openxmlformats.org/officeDocument/2006/relationships" xmlns:p="http://schemas.openxmlformats.org/presentationml/2006/main">
   <p:cSld>
     <p:spTree>
@@ -8759,173 +9032,6 @@
 </p:sld>
 </file>
 
-<file path=ppt/slides/slide19.xml><?xml version="1.0" encoding="utf-8"?>
-<p:sld xmlns:a="http://schemas.openxmlformats.org/drawingml/2006/main" xmlns:r="http://schemas.openxmlformats.org/officeDocument/2006/relationships" xmlns:p="http://schemas.openxmlformats.org/presentationml/2006/main">
-  <p:cSld>
-    <p:spTree>
-      <p:nvGrpSpPr>
-        <p:cNvPr id="1" name=""/>
-        <p:cNvGrpSpPr/>
-        <p:nvPr/>
-      </p:nvGrpSpPr>
-      <p:grpSpPr>
-        <a:xfrm>
-          <a:off x="0" y="0"/>
-          <a:ext cx="0" cy="0"/>
-          <a:chOff x="0" y="0"/>
-          <a:chExt cx="0" cy="0"/>
-        </a:xfrm>
-      </p:grpSpPr>
-      <p:sp>
-        <p:nvSpPr>
-          <p:cNvPr id="2" name="Content Placeholder 1"/>
-          <p:cNvSpPr>
-            <a:spLocks noGrp="1"/>
-          </p:cNvSpPr>
-          <p:nvPr>
-            <p:ph idx="1"/>
-          </p:nvPr>
-        </p:nvSpPr>
-        <p:spPr/>
-        <p:txBody>
-          <a:bodyPr>
-            <a:normAutofit fontScale="85000" lnSpcReduction="20000"/>
-          </a:bodyPr>
-          <a:lstStyle/>
-          <a:p>
-            <a:r>
-              <a:rPr lang="en-US" dirty="0"/>
-              <a:t>There are many New Slide drop down versions</a:t>
-            </a:r>
-          </a:p>
-          <a:p>
-            <a:pPr marL="514350" indent="-514350">
-              <a:buFont typeface="+mj-lt"/>
-              <a:buAutoNum type="arabicPeriod"/>
-            </a:pPr>
-            <a:r>
-              <a:rPr lang="en-US" dirty="0"/>
-              <a:t>Section (optional footer)</a:t>
-            </a:r>
-          </a:p>
-          <a:p>
-            <a:pPr marL="514350" indent="-514350">
-              <a:buFont typeface="+mj-lt"/>
-              <a:buAutoNum type="arabicPeriod"/>
-            </a:pPr>
-            <a:r>
-              <a:rPr lang="en-US" dirty="0"/>
-              <a:t>Indented Content (optional footer)</a:t>
-            </a:r>
-          </a:p>
-          <a:p>
-            <a:pPr marL="514350" indent="-514350">
-              <a:buFont typeface="+mj-lt"/>
-              <a:buAutoNum type="arabicPeriod"/>
-            </a:pPr>
-            <a:r>
-              <a:rPr lang="en-US" dirty="0"/>
-              <a:t>Content (optional footer)</a:t>
-            </a:r>
-          </a:p>
-          <a:p>
-            <a:pPr marL="514350" indent="-514350">
-              <a:buFont typeface="+mj-lt"/>
-              <a:buAutoNum type="arabicPeriod"/>
-            </a:pPr>
-            <a:r>
-              <a:rPr lang="en-US" dirty="0"/>
-              <a:t>Split Content (optional footer)</a:t>
-            </a:r>
-          </a:p>
-          <a:p>
-            <a:pPr marL="514350" indent="-514350">
-              <a:buFont typeface="+mj-lt"/>
-              <a:buAutoNum type="arabicPeriod"/>
-            </a:pPr>
-            <a:r>
-              <a:rPr lang="en-US" dirty="0"/>
-              <a:t>Blank page (optional footer)</a:t>
-            </a:r>
-          </a:p>
-          <a:p>
-            <a:endParaRPr lang="en-US" dirty="0"/>
-          </a:p>
-          <a:p>
-            <a:r>
-              <a:rPr lang="en-US" dirty="0"/>
-              <a:t>Note: You can always hide the footer</a:t>
-            </a:r>
-          </a:p>
-          <a:p>
-            <a:pPr marL="514350" indent="-514350">
-              <a:buFont typeface="+mj-lt"/>
-              <a:buAutoNum type="arabicPeriod"/>
-            </a:pPr>
-            <a:r>
-              <a:rPr lang="en-US" dirty="0"/>
-              <a:t>Click on a blank part of the background</a:t>
-            </a:r>
-          </a:p>
-          <a:p>
-            <a:pPr marL="514350" indent="-514350">
-              <a:buFont typeface="+mj-lt"/>
-              <a:buAutoNum type="arabicPeriod"/>
-            </a:pPr>
-            <a:r>
-              <a:rPr lang="en-US" dirty="0"/>
-              <a:t>Right click and choose “Format Background”</a:t>
-            </a:r>
-          </a:p>
-          <a:p>
-            <a:pPr marL="514350" indent="-514350">
-              <a:buFont typeface="+mj-lt"/>
-              <a:buAutoNum type="arabicPeriod"/>
-            </a:pPr>
-            <a:r>
-              <a:rPr lang="en-US" dirty="0"/>
-              <a:t>Check the “Hide Background” checkbox</a:t>
-            </a:r>
-          </a:p>
-        </p:txBody>
-      </p:sp>
-      <p:sp>
-        <p:nvSpPr>
-          <p:cNvPr id="3" name="Content Placeholder 2"/>
-          <p:cNvSpPr>
-            <a:spLocks noGrp="1"/>
-          </p:cNvSpPr>
-          <p:nvPr>
-            <p:ph idx="10"/>
-          </p:nvPr>
-        </p:nvSpPr>
-        <p:spPr/>
-        <p:txBody>
-          <a:bodyPr>
-            <a:normAutofit/>
-          </a:bodyPr>
-          <a:lstStyle/>
-          <a:p>
-            <a:r>
-              <a:rPr lang="en-US" sz="4000" dirty="0"/>
-              <a:t>“Home-&gt;New Slide” drop down has choices</a:t>
-            </a:r>
-          </a:p>
-        </p:txBody>
-      </p:sp>
-    </p:spTree>
-    <p:extLst>
-      <p:ext uri="{BB962C8B-B14F-4D97-AF65-F5344CB8AC3E}">
-        <p14:creationId xmlns:p14="http://schemas.microsoft.com/office/powerpoint/2010/main" val="2378934828"/>
-      </p:ext>
-    </p:extLst>
-  </p:cSld>
-  <p:clrMapOvr>
-    <a:masterClrMapping/>
-  </p:clrMapOvr>
-</p:sld>
-</file>
-
 <file path=ppt/slides/slide2.xml><?xml version="1.0" encoding="utf-8"?>
 <p:sld xmlns:a="http://schemas.openxmlformats.org/drawingml/2006/main" xmlns:r="http://schemas.openxmlformats.org/officeDocument/2006/relationships" xmlns:p="http://schemas.openxmlformats.org/presentationml/2006/main">
   <p:cSld>
@@ -9357,6 +9463,173 @@
             <p:ph idx="1"/>
           </p:nvPr>
         </p:nvSpPr>
+        <p:spPr/>
+        <p:txBody>
+          <a:bodyPr>
+            <a:normAutofit fontScale="85000" lnSpcReduction="20000"/>
+          </a:bodyPr>
+          <a:lstStyle/>
+          <a:p>
+            <a:r>
+              <a:rPr lang="en-US" dirty="0"/>
+              <a:t>There are many New Slide drop down versions</a:t>
+            </a:r>
+          </a:p>
+          <a:p>
+            <a:pPr marL="514350" indent="-514350">
+              <a:buFont typeface="+mj-lt"/>
+              <a:buAutoNum type="arabicPeriod"/>
+            </a:pPr>
+            <a:r>
+              <a:rPr lang="en-US" dirty="0"/>
+              <a:t>Section (optional footer)</a:t>
+            </a:r>
+          </a:p>
+          <a:p>
+            <a:pPr marL="514350" indent="-514350">
+              <a:buFont typeface="+mj-lt"/>
+              <a:buAutoNum type="arabicPeriod"/>
+            </a:pPr>
+            <a:r>
+              <a:rPr lang="en-US" dirty="0"/>
+              <a:t>Indented Content (optional footer)</a:t>
+            </a:r>
+          </a:p>
+          <a:p>
+            <a:pPr marL="514350" indent="-514350">
+              <a:buFont typeface="+mj-lt"/>
+              <a:buAutoNum type="arabicPeriod"/>
+            </a:pPr>
+            <a:r>
+              <a:rPr lang="en-US" dirty="0"/>
+              <a:t>Content (optional footer)</a:t>
+            </a:r>
+          </a:p>
+          <a:p>
+            <a:pPr marL="514350" indent="-514350">
+              <a:buFont typeface="+mj-lt"/>
+              <a:buAutoNum type="arabicPeriod"/>
+            </a:pPr>
+            <a:r>
+              <a:rPr lang="en-US" dirty="0"/>
+              <a:t>Split Content (optional footer)</a:t>
+            </a:r>
+          </a:p>
+          <a:p>
+            <a:pPr marL="514350" indent="-514350">
+              <a:buFont typeface="+mj-lt"/>
+              <a:buAutoNum type="arabicPeriod"/>
+            </a:pPr>
+            <a:r>
+              <a:rPr lang="en-US" dirty="0"/>
+              <a:t>Blank page (optional footer)</a:t>
+            </a:r>
+          </a:p>
+          <a:p>
+            <a:endParaRPr lang="en-US" dirty="0"/>
+          </a:p>
+          <a:p>
+            <a:r>
+              <a:rPr lang="en-US" dirty="0"/>
+              <a:t>Note: You can always hide the footer</a:t>
+            </a:r>
+          </a:p>
+          <a:p>
+            <a:pPr marL="514350" indent="-514350">
+              <a:buFont typeface="+mj-lt"/>
+              <a:buAutoNum type="arabicPeriod"/>
+            </a:pPr>
+            <a:r>
+              <a:rPr lang="en-US" dirty="0"/>
+              <a:t>Click on a blank part of the background</a:t>
+            </a:r>
+          </a:p>
+          <a:p>
+            <a:pPr marL="514350" indent="-514350">
+              <a:buFont typeface="+mj-lt"/>
+              <a:buAutoNum type="arabicPeriod"/>
+            </a:pPr>
+            <a:r>
+              <a:rPr lang="en-US" dirty="0"/>
+              <a:t>Right click and choose “Format Background”</a:t>
+            </a:r>
+          </a:p>
+          <a:p>
+            <a:pPr marL="514350" indent="-514350">
+              <a:buFont typeface="+mj-lt"/>
+              <a:buAutoNum type="arabicPeriod"/>
+            </a:pPr>
+            <a:r>
+              <a:rPr lang="en-US" dirty="0"/>
+              <a:t>Check the “Hide Background” checkbox</a:t>
+            </a:r>
+          </a:p>
+        </p:txBody>
+      </p:sp>
+      <p:sp>
+        <p:nvSpPr>
+          <p:cNvPr id="3" name="Content Placeholder 2"/>
+          <p:cNvSpPr>
+            <a:spLocks noGrp="1"/>
+          </p:cNvSpPr>
+          <p:nvPr>
+            <p:ph idx="10"/>
+          </p:nvPr>
+        </p:nvSpPr>
+        <p:spPr/>
+        <p:txBody>
+          <a:bodyPr>
+            <a:normAutofit/>
+          </a:bodyPr>
+          <a:lstStyle/>
+          <a:p>
+            <a:r>
+              <a:rPr lang="en-US" sz="4000" dirty="0"/>
+              <a:t>“Home-&gt;New Slide” drop down has choices</a:t>
+            </a:r>
+          </a:p>
+        </p:txBody>
+      </p:sp>
+    </p:spTree>
+    <p:extLst>
+      <p:ext uri="{BB962C8B-B14F-4D97-AF65-F5344CB8AC3E}">
+        <p14:creationId xmlns:p14="http://schemas.microsoft.com/office/powerpoint/2010/main" val="2378934828"/>
+      </p:ext>
+    </p:extLst>
+  </p:cSld>
+  <p:clrMapOvr>
+    <a:masterClrMapping/>
+  </p:clrMapOvr>
+</p:sld>
+</file>
+
+<file path=ppt/slides/slide21.xml><?xml version="1.0" encoding="utf-8"?>
+<p:sld xmlns:a="http://schemas.openxmlformats.org/drawingml/2006/main" xmlns:r="http://schemas.openxmlformats.org/officeDocument/2006/relationships" xmlns:p="http://schemas.openxmlformats.org/presentationml/2006/main">
+  <p:cSld>
+    <p:spTree>
+      <p:nvGrpSpPr>
+        <p:cNvPr id="1" name=""/>
+        <p:cNvGrpSpPr/>
+        <p:nvPr/>
+      </p:nvGrpSpPr>
+      <p:grpSpPr>
+        <a:xfrm>
+          <a:off x="0" y="0"/>
+          <a:ext cx="0" cy="0"/>
+          <a:chOff x="0" y="0"/>
+          <a:chExt cx="0" cy="0"/>
+        </a:xfrm>
+      </p:grpSpPr>
+      <p:sp>
+        <p:nvSpPr>
+          <p:cNvPr id="2" name="Content Placeholder 1"/>
+          <p:cNvSpPr>
+            <a:spLocks noGrp="1"/>
+          </p:cNvSpPr>
+          <p:nvPr>
+            <p:ph idx="1"/>
+          </p:nvPr>
+        </p:nvSpPr>
         <p:spPr>
           <a:xfrm>
             <a:off x="1359462" y="1684421"/>
@@ -9473,7 +9746,7 @@
 </p:sld>
 </file>
 
-<file path=ppt/slides/slide21.xml><?xml version="1.0" encoding="utf-8"?>
+<file path=ppt/slides/slide22.xml><?xml version="1.0" encoding="utf-8"?>
 <p:sld xmlns:a="http://schemas.openxmlformats.org/drawingml/2006/main" xmlns:r="http://schemas.openxmlformats.org/officeDocument/2006/relationships" xmlns:p="http://schemas.openxmlformats.org/presentationml/2006/main">
   <p:cSld>
     <p:spTree>
@@ -12033,7 +12306,7 @@
 </p:sld>
 </file>
 
-<file path=ppt/slides/slide22.xml><?xml version="1.0" encoding="utf-8"?>
+<file path=ppt/slides/slide23.xml><?xml version="1.0" encoding="utf-8"?>
 <p:sld xmlns:a="http://schemas.openxmlformats.org/drawingml/2006/main" xmlns:r="http://schemas.openxmlformats.org/officeDocument/2006/relationships" xmlns:p="http://schemas.openxmlformats.org/presentationml/2006/main">
   <p:cSld>
     <p:spTree>
@@ -12246,7 +12519,7 @@
 </p:sld>
 </file>
 
-<file path=ppt/slides/slide23.xml><?xml version="1.0" encoding="utf-8"?>
+<file path=ppt/slides/slide24.xml><?xml version="1.0" encoding="utf-8"?>
 <p:sld xmlns:a="http://schemas.openxmlformats.org/drawingml/2006/main" xmlns:r="http://schemas.openxmlformats.org/officeDocument/2006/relationships" xmlns:p="http://schemas.openxmlformats.org/presentationml/2006/main">
   <p:cSld>
     <p:spTree>
@@ -12459,7 +12732,7 @@
 </p:sld>
 </file>
 
-<file path=ppt/slides/slide24.xml><?xml version="1.0" encoding="utf-8"?>
+<file path=ppt/slides/slide25.xml><?xml version="1.0" encoding="utf-8"?>
 <p:sld xmlns:a="http://schemas.openxmlformats.org/drawingml/2006/main" xmlns:r="http://schemas.openxmlformats.org/officeDocument/2006/relationships" xmlns:p="http://schemas.openxmlformats.org/presentationml/2006/main">
   <p:cSld>
     <p:spTree>
@@ -12607,7 +12880,7 @@
           <p:nvPr/>
         </p:nvPicPr>
         <p:blipFill>
-          <a:blip r:embed="rId2">
+          <a:blip r:embed="rId3">
             <a:extLst>
               <a:ext uri="{28A0092B-C50C-407E-A947-70E740481C1C}">
                 <a14:useLocalDpi xmlns:a14="http://schemas.microsoft.com/office/drawing/2010/main" val="0"/>
@@ -12804,7 +13077,7 @@
                   </a:schemeClr>
                 </a:solidFill>
               </a:rPr>
-              <a:t>Decomposition </a:t>
+              <a:t>Hierarchical/Decomposition </a:t>
             </a:r>
           </a:p>
           <a:p>
@@ -13187,28 +13460,6 @@
               <a:t>Better control</a:t>
             </a:r>
           </a:p>
-          <a:p>
-            <a:pPr marL="514350" indent="-514350">
-              <a:buClr>
-                <a:schemeClr val="accent2"/>
-              </a:buClr>
-              <a:buFont typeface="+mj-lt"/>
-              <a:buAutoNum type="arabicPeriod"/>
-            </a:pPr>
-            <a:r>
-              <a:rPr lang="en-US" dirty="0">
-                <a:solidFill>
-                  <a:schemeClr val="bg1">
-                    <a:lumMod val="50000"/>
-                  </a:schemeClr>
-                </a:solidFill>
-              </a:rPr>
-              <a:t>High code reuse</a:t>
-            </a:r>
-          </a:p>
-          <a:p>
-            <a:endParaRPr lang="en-US" dirty="0"/>
-          </a:p>
         </p:txBody>
       </p:sp>
       <p:sp>
@@ -13433,67 +13684,6 @@
                                           <p:spTgt spid="2">
                                             <p:txEl>
                                               <p:pRg st="3" end="3"/>
-                                            </p:txEl>
-                                          </p:spTgt>
-                                        </p:tgtEl>
-                                      </p:cBhvr>
-                                    </p:animEffect>
-                                  </p:childTnLst>
-                                </p:cTn>
-                              </p:par>
-                            </p:childTnLst>
-                          </p:cTn>
-                        </p:par>
-                      </p:childTnLst>
-                    </p:cTn>
-                  </p:par>
-                  <p:par>
-                    <p:cTn id="18" fill="hold">
-                      <p:stCondLst>
-                        <p:cond delay="indefinite"/>
-                      </p:stCondLst>
-                      <p:childTnLst>
-                        <p:par>
-                          <p:cTn id="19" fill="hold">
-                            <p:stCondLst>
-                              <p:cond delay="0"/>
-                            </p:stCondLst>
-                            <p:childTnLst>
-                              <p:par>
-                                <p:cTn id="20" presetID="10" presetClass="entr" presetSubtype="0" fill="hold" grpId="0" nodeType="clickEffect">
-                                  <p:stCondLst>
-                                    <p:cond delay="0"/>
-                                  </p:stCondLst>
-                                  <p:childTnLst>
-                                    <p:set>
-                                      <p:cBhvr>
-                                        <p:cTn id="21" dur="1" fill="hold">
-                                          <p:stCondLst>
-                                            <p:cond delay="0"/>
-                                          </p:stCondLst>
-                                        </p:cTn>
-                                        <p:tgtEl>
-                                          <p:spTgt spid="2">
-                                            <p:txEl>
-                                              <p:pRg st="4" end="4"/>
-                                            </p:txEl>
-                                          </p:spTgt>
-                                        </p:tgtEl>
-                                        <p:attrNameLst>
-                                          <p:attrName>style.visibility</p:attrName>
-                                        </p:attrNameLst>
-                                      </p:cBhvr>
-                                      <p:to>
-                                        <p:strVal val="visible"/>
-                                      </p:to>
-                                    </p:set>
-                                    <p:animEffect transition="in" filter="fade">
-                                      <p:cBhvr>
-                                        <p:cTn id="22" dur="500"/>
-                                        <p:tgtEl>
-                                          <p:spTgt spid="2">
-                                            <p:txEl>
-                                              <p:pRg st="4" end="4"/>
                                             </p:txEl>
                                           </p:spTgt>
                                         </p:tgtEl>

</xml_diff>

<commit_message>
Text for task and updated powerpoint
</commit_message>
<xml_diff>
--- a/FirstNameLastName_Planning.pptx
+++ b/FirstNameLastName_Planning.pptx
@@ -23,16 +23,16 @@
     <p:sldId id="297" r:id="rId14"/>
     <p:sldId id="301" r:id="rId15"/>
     <p:sldId id="300" r:id="rId16"/>
-    <p:sldId id="290" r:id="rId17"/>
-    <p:sldId id="280" r:id="rId18"/>
-    <p:sldId id="281" r:id="rId19"/>
-    <p:sldId id="282" r:id="rId20"/>
-    <p:sldId id="283" r:id="rId21"/>
-    <p:sldId id="284" r:id="rId22"/>
-    <p:sldId id="285" r:id="rId23"/>
-    <p:sldId id="286" r:id="rId24"/>
-    <p:sldId id="287" r:id="rId25"/>
-    <p:sldId id="269" r:id="rId26"/>
+    <p:sldId id="269" r:id="rId17"/>
+    <p:sldId id="290" r:id="rId18"/>
+    <p:sldId id="280" r:id="rId19"/>
+    <p:sldId id="281" r:id="rId20"/>
+    <p:sldId id="282" r:id="rId21"/>
+    <p:sldId id="283" r:id="rId22"/>
+    <p:sldId id="284" r:id="rId23"/>
+    <p:sldId id="285" r:id="rId24"/>
+    <p:sldId id="286" r:id="rId25"/>
+    <p:sldId id="287" r:id="rId26"/>
   </p:sldIdLst>
   <p:sldSz cx="12192000" cy="6858000"/>
   <p:notesSz cx="6858000" cy="9144000"/>
@@ -221,7 +221,7 @@
           <a:p>
             <a:fld id="{57789014-B0AA-4E7E-BB0D-3C010066DA41}" type="datetimeFigureOut">
               <a:rPr lang="en-US" smtClean="0"/>
-              <a:t>4/8/2021</a:t>
+              <a:t>4/10/2021</a:t>
             </a:fld>
             <a:endParaRPr lang="en-US"/>
           </a:p>
@@ -7874,8 +7874,26 @@
           </a:p>
           <a:p>
             <a:r>
-              <a:rPr lang="en-US" dirty="0"/>
+              <a:rPr lang="en-US" dirty="0">
+                <a:solidFill>
+                  <a:schemeClr val="bg1">
+                    <a:lumMod val="50000"/>
+                  </a:schemeClr>
+                </a:solidFill>
+              </a:rPr>
               <a:t>Find a way to get invertible tasks consistently</a:t>
+            </a:r>
+          </a:p>
+          <a:p>
+            <a:r>
+              <a:rPr lang="en-US" dirty="0">
+                <a:solidFill>
+                  <a:schemeClr val="bg1">
+                    <a:lumMod val="50000"/>
+                  </a:schemeClr>
+                </a:solidFill>
+              </a:rPr>
+              <a:t>A-Star vs Depth first</a:t>
             </a:r>
           </a:p>
         </p:txBody>
@@ -7931,10 +7949,214 @@
   <p:clrMapOvr>
     <a:masterClrMapping/>
   </p:clrMapOvr>
+  <p:timing>
+    <p:tnLst>
+      <p:par>
+        <p:cTn id="1" dur="indefinite" restart="never" nodeType="tmRoot">
+          <p:childTnLst>
+            <p:seq concurrent="1" nextAc="seek">
+              <p:cTn id="2" dur="indefinite" nodeType="mainSeq">
+                <p:childTnLst>
+                  <p:par>
+                    <p:cTn id="3" fill="hold">
+                      <p:stCondLst>
+                        <p:cond delay="indefinite"/>
+                      </p:stCondLst>
+                      <p:childTnLst>
+                        <p:par>
+                          <p:cTn id="4" fill="hold">
+                            <p:stCondLst>
+                              <p:cond delay="0"/>
+                            </p:stCondLst>
+                            <p:childTnLst>
+                              <p:par>
+                                <p:cTn id="5" presetID="10" presetClass="entr" presetSubtype="0" fill="hold" nodeType="clickEffect">
+                                  <p:stCondLst>
+                                    <p:cond delay="0"/>
+                                  </p:stCondLst>
+                                  <p:childTnLst>
+                                    <p:set>
+                                      <p:cBhvr>
+                                        <p:cTn id="6" dur="1" fill="hold">
+                                          <p:stCondLst>
+                                            <p:cond delay="0"/>
+                                          </p:stCondLst>
+                                        </p:cTn>
+                                        <p:tgtEl>
+                                          <p:spTgt spid="2">
+                                            <p:txEl>
+                                              <p:pRg st="1" end="1"/>
+                                            </p:txEl>
+                                          </p:spTgt>
+                                        </p:tgtEl>
+                                        <p:attrNameLst>
+                                          <p:attrName>style.visibility</p:attrName>
+                                        </p:attrNameLst>
+                                      </p:cBhvr>
+                                      <p:to>
+                                        <p:strVal val="visible"/>
+                                      </p:to>
+                                    </p:set>
+                                    <p:animEffect transition="in" filter="fade">
+                                      <p:cBhvr>
+                                        <p:cTn id="7" dur="500"/>
+                                        <p:tgtEl>
+                                          <p:spTgt spid="2">
+                                            <p:txEl>
+                                              <p:pRg st="1" end="1"/>
+                                            </p:txEl>
+                                          </p:spTgt>
+                                        </p:tgtEl>
+                                      </p:cBhvr>
+                                    </p:animEffect>
+                                  </p:childTnLst>
+                                </p:cTn>
+                              </p:par>
+                            </p:childTnLst>
+                          </p:cTn>
+                        </p:par>
+                      </p:childTnLst>
+                    </p:cTn>
+                  </p:par>
+                  <p:par>
+                    <p:cTn id="8" fill="hold">
+                      <p:stCondLst>
+                        <p:cond delay="indefinite"/>
+                      </p:stCondLst>
+                      <p:childTnLst>
+                        <p:par>
+                          <p:cTn id="9" fill="hold">
+                            <p:stCondLst>
+                              <p:cond delay="0"/>
+                            </p:stCondLst>
+                            <p:childTnLst>
+                              <p:par>
+                                <p:cTn id="10" presetID="10" presetClass="entr" presetSubtype="0" fill="hold" nodeType="clickEffect">
+                                  <p:stCondLst>
+                                    <p:cond delay="0"/>
+                                  </p:stCondLst>
+                                  <p:childTnLst>
+                                    <p:set>
+                                      <p:cBhvr>
+                                        <p:cTn id="11" dur="1" fill="hold">
+                                          <p:stCondLst>
+                                            <p:cond delay="0"/>
+                                          </p:stCondLst>
+                                        </p:cTn>
+                                        <p:tgtEl>
+                                          <p:spTgt spid="2">
+                                            <p:txEl>
+                                              <p:pRg st="2" end="2"/>
+                                            </p:txEl>
+                                          </p:spTgt>
+                                        </p:tgtEl>
+                                        <p:attrNameLst>
+                                          <p:attrName>style.visibility</p:attrName>
+                                        </p:attrNameLst>
+                                      </p:cBhvr>
+                                      <p:to>
+                                        <p:strVal val="visible"/>
+                                      </p:to>
+                                    </p:set>
+                                    <p:animEffect transition="in" filter="fade">
+                                      <p:cBhvr>
+                                        <p:cTn id="12" dur="500"/>
+                                        <p:tgtEl>
+                                          <p:spTgt spid="2">
+                                            <p:txEl>
+                                              <p:pRg st="2" end="2"/>
+                                            </p:txEl>
+                                          </p:spTgt>
+                                        </p:tgtEl>
+                                      </p:cBhvr>
+                                    </p:animEffect>
+                                  </p:childTnLst>
+                                </p:cTn>
+                              </p:par>
+                            </p:childTnLst>
+                          </p:cTn>
+                        </p:par>
+                      </p:childTnLst>
+                    </p:cTn>
+                  </p:par>
+                </p:childTnLst>
+              </p:cTn>
+              <p:prevCondLst>
+                <p:cond evt="onPrev" delay="0">
+                  <p:tgtEl>
+                    <p:sldTgt/>
+                  </p:tgtEl>
+                </p:cond>
+              </p:prevCondLst>
+              <p:nextCondLst>
+                <p:cond evt="onNext" delay="0">
+                  <p:tgtEl>
+                    <p:sldTgt/>
+                  </p:tgtEl>
+                </p:cond>
+              </p:nextCondLst>
+            </p:seq>
+          </p:childTnLst>
+        </p:cTn>
+      </p:par>
+    </p:tnLst>
+  </p:timing>
 </p:sld>
 </file>
 
 <file path=ppt/slides/slide16.xml><?xml version="1.0" encoding="utf-8"?>
+<p:sld xmlns:a="http://schemas.openxmlformats.org/drawingml/2006/main" xmlns:r="http://schemas.openxmlformats.org/officeDocument/2006/relationships" xmlns:p="http://schemas.openxmlformats.org/presentationml/2006/main">
+  <p:cSld>
+    <p:spTree>
+      <p:nvGrpSpPr>
+        <p:cNvPr id="1" name=""/>
+        <p:cNvGrpSpPr/>
+        <p:nvPr/>
+      </p:nvGrpSpPr>
+      <p:grpSpPr>
+        <a:xfrm>
+          <a:off x="0" y="0"/>
+          <a:ext cx="0" cy="0"/>
+          <a:chOff x="0" y="0"/>
+          <a:chExt cx="0" cy="0"/>
+        </a:xfrm>
+      </p:grpSpPr>
+      <p:sp>
+        <p:nvSpPr>
+          <p:cNvPr id="2" name="Title 1"/>
+          <p:cNvSpPr>
+            <a:spLocks noGrp="1"/>
+          </p:cNvSpPr>
+          <p:nvPr>
+            <p:ph type="ctrTitle"/>
+          </p:nvPr>
+        </p:nvSpPr>
+        <p:spPr/>
+        <p:txBody>
+          <a:bodyPr/>
+          <a:lstStyle/>
+          <a:p>
+            <a:r>
+              <a:rPr lang="en-US" dirty="0"/>
+              <a:t>Questions/Comments</a:t>
+            </a:r>
+          </a:p>
+        </p:txBody>
+      </p:sp>
+    </p:spTree>
+    <p:extLst>
+      <p:ext uri="{BB962C8B-B14F-4D97-AF65-F5344CB8AC3E}">
+        <p14:creationId xmlns:p14="http://schemas.microsoft.com/office/powerpoint/2010/main" val="2331009622"/>
+      </p:ext>
+    </p:extLst>
+  </p:cSld>
+  <p:clrMapOvr>
+    <a:masterClrMapping/>
+  </p:clrMapOvr>
+</p:sld>
+</file>
+
+<file path=ppt/slides/slide17.xml><?xml version="1.0" encoding="utf-8"?>
 <p:sld xmlns:a="http://schemas.openxmlformats.org/drawingml/2006/main" xmlns:r="http://schemas.openxmlformats.org/officeDocument/2006/relationships" xmlns:p="http://schemas.openxmlformats.org/presentationml/2006/main">
   <p:cSld>
     <p:spTree>
@@ -8062,114 +8284,6 @@
     <p:extLst>
       <p:ext uri="{BB962C8B-B14F-4D97-AF65-F5344CB8AC3E}">
         <p14:creationId xmlns:p14="http://schemas.microsoft.com/office/powerpoint/2010/main" val="159131091"/>
-      </p:ext>
-    </p:extLst>
-  </p:cSld>
-  <p:clrMapOvr>
-    <a:masterClrMapping/>
-  </p:clrMapOvr>
-</p:sld>
-</file>
-
-<file path=ppt/slides/slide17.xml><?xml version="1.0" encoding="utf-8"?>
-<p:sld xmlns:a="http://schemas.openxmlformats.org/drawingml/2006/main" xmlns:r="http://schemas.openxmlformats.org/officeDocument/2006/relationships" xmlns:p="http://schemas.openxmlformats.org/presentationml/2006/main">
-  <p:cSld>
-    <p:spTree>
-      <p:nvGrpSpPr>
-        <p:cNvPr id="1" name=""/>
-        <p:cNvGrpSpPr/>
-        <p:nvPr/>
-      </p:nvGrpSpPr>
-      <p:grpSpPr>
-        <a:xfrm>
-          <a:off x="0" y="0"/>
-          <a:ext cx="0" cy="0"/>
-          <a:chOff x="0" y="0"/>
-          <a:chExt cx="0" cy="0"/>
-        </a:xfrm>
-      </p:grpSpPr>
-      <p:sp>
-        <p:nvSpPr>
-          <p:cNvPr id="2" name="Content Placeholder 1"/>
-          <p:cNvSpPr>
-            <a:spLocks noGrp="1"/>
-          </p:cNvSpPr>
-          <p:nvPr>
-            <p:ph idx="1"/>
-          </p:nvPr>
-        </p:nvSpPr>
-        <p:spPr/>
-        <p:txBody>
-          <a:bodyPr/>
-          <a:lstStyle/>
-          <a:p>
-            <a:endParaRPr lang="en-US" dirty="0"/>
-          </a:p>
-          <a:p>
-            <a:r>
-              <a:rPr lang="en-US" dirty="0"/>
-              <a:t>Minimize your use of text</a:t>
-            </a:r>
-          </a:p>
-          <a:p>
-            <a:pPr marL="1143000" lvl="1" indent="-457200"/>
-            <a:r>
-              <a:rPr lang="en-US" dirty="0"/>
-              <a:t>Use bullets sparingly (better to just say it)</a:t>
-            </a:r>
-          </a:p>
-          <a:p>
-            <a:pPr marL="1143000" lvl="1" indent="-457200"/>
-            <a:r>
-              <a:rPr lang="en-US" dirty="0"/>
-              <a:t>Minimize the “noise” on each slide</a:t>
-            </a:r>
-          </a:p>
-          <a:p>
-            <a:pPr marL="1143000" lvl="1" indent="-457200"/>
-            <a:r>
-              <a:rPr lang="en-US" dirty="0"/>
-              <a:t>No one wants to read your presentation</a:t>
-            </a:r>
-          </a:p>
-          <a:p>
-            <a:pPr marL="1143000" lvl="1" indent="-457200"/>
-            <a:r>
-              <a:rPr lang="en-US" dirty="0"/>
-              <a:t>Use “effective redundancy” and let your slides add value in addition to what you say</a:t>
-            </a:r>
-          </a:p>
-          <a:p>
-            <a:endParaRPr lang="en-US" dirty="0"/>
-          </a:p>
-        </p:txBody>
-      </p:sp>
-      <p:sp>
-        <p:nvSpPr>
-          <p:cNvPr id="3" name="Content Placeholder 2"/>
-          <p:cNvSpPr>
-            <a:spLocks noGrp="1"/>
-          </p:cNvSpPr>
-          <p:nvPr>
-            <p:ph idx="10"/>
-          </p:nvPr>
-        </p:nvSpPr>
-        <p:spPr/>
-        <p:txBody>
-          <a:bodyPr/>
-          <a:lstStyle/>
-          <a:p>
-            <a:r>
-              <a:rPr lang="en-US" dirty="0"/>
-              <a:t>Sentence that explains the point</a:t>
-            </a:r>
-          </a:p>
-        </p:txBody>
-      </p:sp>
-    </p:spTree>
-    <p:extLst>
-      <p:ext uri="{BB962C8B-B14F-4D97-AF65-F5344CB8AC3E}">
-        <p14:creationId xmlns:p14="http://schemas.microsoft.com/office/powerpoint/2010/main" val="2844394451"/>
       </p:ext>
     </p:extLst>
   </p:cSld>
@@ -8208,6 +8322,114 @@
         </p:nvSpPr>
         <p:spPr/>
         <p:txBody>
+          <a:bodyPr/>
+          <a:lstStyle/>
+          <a:p>
+            <a:endParaRPr lang="en-US" dirty="0"/>
+          </a:p>
+          <a:p>
+            <a:r>
+              <a:rPr lang="en-US" dirty="0"/>
+              <a:t>Minimize your use of text</a:t>
+            </a:r>
+          </a:p>
+          <a:p>
+            <a:pPr marL="1143000" lvl="1" indent="-457200"/>
+            <a:r>
+              <a:rPr lang="en-US" dirty="0"/>
+              <a:t>Use bullets sparingly (better to just say it)</a:t>
+            </a:r>
+          </a:p>
+          <a:p>
+            <a:pPr marL="1143000" lvl="1" indent="-457200"/>
+            <a:r>
+              <a:rPr lang="en-US" dirty="0"/>
+              <a:t>Minimize the “noise” on each slide</a:t>
+            </a:r>
+          </a:p>
+          <a:p>
+            <a:pPr marL="1143000" lvl="1" indent="-457200"/>
+            <a:r>
+              <a:rPr lang="en-US" dirty="0"/>
+              <a:t>No one wants to read your presentation</a:t>
+            </a:r>
+          </a:p>
+          <a:p>
+            <a:pPr marL="1143000" lvl="1" indent="-457200"/>
+            <a:r>
+              <a:rPr lang="en-US" dirty="0"/>
+              <a:t>Use “effective redundancy” and let your slides add value in addition to what you say</a:t>
+            </a:r>
+          </a:p>
+          <a:p>
+            <a:endParaRPr lang="en-US" dirty="0"/>
+          </a:p>
+        </p:txBody>
+      </p:sp>
+      <p:sp>
+        <p:nvSpPr>
+          <p:cNvPr id="3" name="Content Placeholder 2"/>
+          <p:cNvSpPr>
+            <a:spLocks noGrp="1"/>
+          </p:cNvSpPr>
+          <p:nvPr>
+            <p:ph idx="10"/>
+          </p:nvPr>
+        </p:nvSpPr>
+        <p:spPr/>
+        <p:txBody>
+          <a:bodyPr/>
+          <a:lstStyle/>
+          <a:p>
+            <a:r>
+              <a:rPr lang="en-US" dirty="0"/>
+              <a:t>Sentence that explains the point</a:t>
+            </a:r>
+          </a:p>
+        </p:txBody>
+      </p:sp>
+    </p:spTree>
+    <p:extLst>
+      <p:ext uri="{BB962C8B-B14F-4D97-AF65-F5344CB8AC3E}">
+        <p14:creationId xmlns:p14="http://schemas.microsoft.com/office/powerpoint/2010/main" val="2844394451"/>
+      </p:ext>
+    </p:extLst>
+  </p:cSld>
+  <p:clrMapOvr>
+    <a:masterClrMapping/>
+  </p:clrMapOvr>
+</p:sld>
+</file>
+
+<file path=ppt/slides/slide19.xml><?xml version="1.0" encoding="utf-8"?>
+<p:sld xmlns:a="http://schemas.openxmlformats.org/drawingml/2006/main" xmlns:r="http://schemas.openxmlformats.org/officeDocument/2006/relationships" xmlns:p="http://schemas.openxmlformats.org/presentationml/2006/main">
+  <p:cSld>
+    <p:spTree>
+      <p:nvGrpSpPr>
+        <p:cNvPr id="1" name=""/>
+        <p:cNvGrpSpPr/>
+        <p:nvPr/>
+      </p:nvGrpSpPr>
+      <p:grpSpPr>
+        <a:xfrm>
+          <a:off x="0" y="0"/>
+          <a:ext cx="0" cy="0"/>
+          <a:chOff x="0" y="0"/>
+          <a:chExt cx="0" cy="0"/>
+        </a:xfrm>
+      </p:grpSpPr>
+      <p:sp>
+        <p:nvSpPr>
+          <p:cNvPr id="2" name="Content Placeholder 1"/>
+          <p:cNvSpPr>
+            <a:spLocks noGrp="1"/>
+          </p:cNvSpPr>
+          <p:nvPr>
+            <p:ph idx="1"/>
+          </p:nvPr>
+        </p:nvSpPr>
+        <p:spPr/>
+        <p:txBody>
           <a:bodyPr>
             <a:normAutofit lnSpcReduction="10000"/>
           </a:bodyPr>
@@ -8350,7 +8572,411 @@
 </p:sld>
 </file>
 
-<file path=ppt/slides/slide19.xml><?xml version="1.0" encoding="utf-8"?>
+<file path=ppt/slides/slide2.xml><?xml version="1.0" encoding="utf-8"?>
+<p:sld xmlns:a="http://schemas.openxmlformats.org/drawingml/2006/main" xmlns:r="http://schemas.openxmlformats.org/officeDocument/2006/relationships" xmlns:p="http://schemas.openxmlformats.org/presentationml/2006/main">
+  <p:cSld>
+    <p:spTree>
+      <p:nvGrpSpPr>
+        <p:cNvPr id="1" name=""/>
+        <p:cNvGrpSpPr/>
+        <p:nvPr/>
+      </p:nvGrpSpPr>
+      <p:grpSpPr>
+        <a:xfrm>
+          <a:off x="0" y="0"/>
+          <a:ext cx="0" cy="0"/>
+          <a:chOff x="0" y="0"/>
+          <a:chExt cx="0" cy="0"/>
+        </a:xfrm>
+      </p:grpSpPr>
+      <p:sp>
+        <p:nvSpPr>
+          <p:cNvPr id="2" name="Title 1"/>
+          <p:cNvSpPr>
+            <a:spLocks noGrp="1"/>
+          </p:cNvSpPr>
+          <p:nvPr>
+            <p:ph type="title"/>
+          </p:nvPr>
+        </p:nvSpPr>
+        <p:spPr/>
+        <p:txBody>
+          <a:bodyPr/>
+          <a:lstStyle/>
+          <a:p>
+            <a:r>
+              <a:rPr lang="en-US" dirty="0"/>
+              <a:t>Cooperative agents using planning</a:t>
+            </a:r>
+            <a:br>
+              <a:rPr lang="en-US" dirty="0"/>
+            </a:br>
+            <a:br>
+              <a:rPr lang="en-US" dirty="0"/>
+            </a:br>
+            <a:endParaRPr lang="en-US" dirty="0"/>
+          </a:p>
+        </p:txBody>
+      </p:sp>
+      <p:sp>
+        <p:nvSpPr>
+          <p:cNvPr id="3" name="Text Placeholder 2"/>
+          <p:cNvSpPr>
+            <a:spLocks noGrp="1"/>
+          </p:cNvSpPr>
+          <p:nvPr>
+            <p:ph type="body" idx="1"/>
+          </p:nvPr>
+        </p:nvSpPr>
+        <p:spPr/>
+        <p:txBody>
+          <a:bodyPr/>
+          <a:lstStyle/>
+          <a:p>
+            <a:r>
+              <a:rPr lang="en-US" dirty="0">
+                <a:solidFill>
+                  <a:schemeClr val="tx1">
+                    <a:lumMod val="75000"/>
+                    <a:lumOff val="25000"/>
+                  </a:schemeClr>
+                </a:solidFill>
+              </a:rPr>
+              <a:t>Hieratical Planning Or Goal Oriented Action Planning</a:t>
+            </a:r>
+          </a:p>
+          <a:p>
+            <a:r>
+              <a:rPr lang="en-US" dirty="0">
+                <a:solidFill>
+                  <a:schemeClr val="tx1">
+                    <a:lumMod val="75000"/>
+                    <a:lumOff val="25000"/>
+                  </a:schemeClr>
+                </a:solidFill>
+              </a:rPr>
+              <a:t>Demo</a:t>
+            </a:r>
+          </a:p>
+          <a:p>
+            <a:r>
+              <a:rPr lang="en-US" dirty="0">
+                <a:solidFill>
+                  <a:schemeClr val="tx1">
+                    <a:lumMod val="75000"/>
+                    <a:lumOff val="25000"/>
+                  </a:schemeClr>
+                </a:solidFill>
+              </a:rPr>
+              <a:t>How it works</a:t>
+            </a:r>
+          </a:p>
+          <a:p>
+            <a:r>
+              <a:rPr lang="en-US" dirty="0">
+                <a:solidFill>
+                  <a:schemeClr val="tx1">
+                    <a:lumMod val="75000"/>
+                    <a:lumOff val="25000"/>
+                  </a:schemeClr>
+                </a:solidFill>
+              </a:rPr>
+              <a:t>Farther Work</a:t>
+            </a:r>
+          </a:p>
+        </p:txBody>
+      </p:sp>
+    </p:spTree>
+    <p:extLst>
+      <p:ext uri="{BB962C8B-B14F-4D97-AF65-F5344CB8AC3E}">
+        <p14:creationId xmlns:p14="http://schemas.microsoft.com/office/powerpoint/2010/main" val="137745307"/>
+      </p:ext>
+    </p:extLst>
+  </p:cSld>
+  <p:clrMapOvr>
+    <a:masterClrMapping/>
+  </p:clrMapOvr>
+  <p:timing>
+    <p:tnLst>
+      <p:par>
+        <p:cTn id="1" dur="indefinite" restart="never" nodeType="tmRoot">
+          <p:childTnLst>
+            <p:seq concurrent="1" nextAc="seek">
+              <p:cTn id="2" dur="indefinite" nodeType="mainSeq">
+                <p:childTnLst>
+                  <p:par>
+                    <p:cTn id="3" fill="hold">
+                      <p:stCondLst>
+                        <p:cond delay="indefinite"/>
+                      </p:stCondLst>
+                      <p:childTnLst>
+                        <p:par>
+                          <p:cTn id="4" fill="hold">
+                            <p:stCondLst>
+                              <p:cond delay="0"/>
+                            </p:stCondLst>
+                            <p:childTnLst>
+                              <p:par>
+                                <p:cTn id="5" presetID="10" presetClass="entr" presetSubtype="0" fill="hold" grpId="0" nodeType="clickEffect">
+                                  <p:stCondLst>
+                                    <p:cond delay="0"/>
+                                  </p:stCondLst>
+                                  <p:childTnLst>
+                                    <p:set>
+                                      <p:cBhvr>
+                                        <p:cTn id="6" dur="1" fill="hold">
+                                          <p:stCondLst>
+                                            <p:cond delay="0"/>
+                                          </p:stCondLst>
+                                        </p:cTn>
+                                        <p:tgtEl>
+                                          <p:spTgt spid="3">
+                                            <p:txEl>
+                                              <p:pRg st="0" end="0"/>
+                                            </p:txEl>
+                                          </p:spTgt>
+                                        </p:tgtEl>
+                                        <p:attrNameLst>
+                                          <p:attrName>style.visibility</p:attrName>
+                                        </p:attrNameLst>
+                                      </p:cBhvr>
+                                      <p:to>
+                                        <p:strVal val="visible"/>
+                                      </p:to>
+                                    </p:set>
+                                    <p:animEffect transition="in" filter="fade">
+                                      <p:cBhvr>
+                                        <p:cTn id="7" dur="500"/>
+                                        <p:tgtEl>
+                                          <p:spTgt spid="3">
+                                            <p:txEl>
+                                              <p:pRg st="0" end="0"/>
+                                            </p:txEl>
+                                          </p:spTgt>
+                                        </p:tgtEl>
+                                      </p:cBhvr>
+                                    </p:animEffect>
+                                  </p:childTnLst>
+                                </p:cTn>
+                              </p:par>
+                            </p:childTnLst>
+                          </p:cTn>
+                        </p:par>
+                      </p:childTnLst>
+                    </p:cTn>
+                  </p:par>
+                  <p:par>
+                    <p:cTn id="8" fill="hold">
+                      <p:stCondLst>
+                        <p:cond delay="indefinite"/>
+                      </p:stCondLst>
+                      <p:childTnLst>
+                        <p:par>
+                          <p:cTn id="9" fill="hold">
+                            <p:stCondLst>
+                              <p:cond delay="0"/>
+                            </p:stCondLst>
+                            <p:childTnLst>
+                              <p:par>
+                                <p:cTn id="10" presetID="10" presetClass="entr" presetSubtype="0" fill="hold" grpId="0" nodeType="clickEffect">
+                                  <p:stCondLst>
+                                    <p:cond delay="0"/>
+                                  </p:stCondLst>
+                                  <p:childTnLst>
+                                    <p:set>
+                                      <p:cBhvr>
+                                        <p:cTn id="11" dur="1" fill="hold">
+                                          <p:stCondLst>
+                                            <p:cond delay="0"/>
+                                          </p:stCondLst>
+                                        </p:cTn>
+                                        <p:tgtEl>
+                                          <p:spTgt spid="3">
+                                            <p:txEl>
+                                              <p:pRg st="1" end="1"/>
+                                            </p:txEl>
+                                          </p:spTgt>
+                                        </p:tgtEl>
+                                        <p:attrNameLst>
+                                          <p:attrName>style.visibility</p:attrName>
+                                        </p:attrNameLst>
+                                      </p:cBhvr>
+                                      <p:to>
+                                        <p:strVal val="visible"/>
+                                      </p:to>
+                                    </p:set>
+                                    <p:animEffect transition="in" filter="fade">
+                                      <p:cBhvr>
+                                        <p:cTn id="12" dur="500"/>
+                                        <p:tgtEl>
+                                          <p:spTgt spid="3">
+                                            <p:txEl>
+                                              <p:pRg st="1" end="1"/>
+                                            </p:txEl>
+                                          </p:spTgt>
+                                        </p:tgtEl>
+                                      </p:cBhvr>
+                                    </p:animEffect>
+                                  </p:childTnLst>
+                                </p:cTn>
+                              </p:par>
+                            </p:childTnLst>
+                          </p:cTn>
+                        </p:par>
+                      </p:childTnLst>
+                    </p:cTn>
+                  </p:par>
+                  <p:par>
+                    <p:cTn id="13" fill="hold">
+                      <p:stCondLst>
+                        <p:cond delay="indefinite"/>
+                      </p:stCondLst>
+                      <p:childTnLst>
+                        <p:par>
+                          <p:cTn id="14" fill="hold">
+                            <p:stCondLst>
+                              <p:cond delay="0"/>
+                            </p:stCondLst>
+                            <p:childTnLst>
+                              <p:par>
+                                <p:cTn id="15" presetID="10" presetClass="entr" presetSubtype="0" fill="hold" grpId="0" nodeType="clickEffect">
+                                  <p:stCondLst>
+                                    <p:cond delay="0"/>
+                                  </p:stCondLst>
+                                  <p:childTnLst>
+                                    <p:set>
+                                      <p:cBhvr>
+                                        <p:cTn id="16" dur="1" fill="hold">
+                                          <p:stCondLst>
+                                            <p:cond delay="0"/>
+                                          </p:stCondLst>
+                                        </p:cTn>
+                                        <p:tgtEl>
+                                          <p:spTgt spid="3">
+                                            <p:txEl>
+                                              <p:pRg st="2" end="2"/>
+                                            </p:txEl>
+                                          </p:spTgt>
+                                        </p:tgtEl>
+                                        <p:attrNameLst>
+                                          <p:attrName>style.visibility</p:attrName>
+                                        </p:attrNameLst>
+                                      </p:cBhvr>
+                                      <p:to>
+                                        <p:strVal val="visible"/>
+                                      </p:to>
+                                    </p:set>
+                                    <p:animEffect transition="in" filter="fade">
+                                      <p:cBhvr>
+                                        <p:cTn id="17" dur="500"/>
+                                        <p:tgtEl>
+                                          <p:spTgt spid="3">
+                                            <p:txEl>
+                                              <p:pRg st="2" end="2"/>
+                                            </p:txEl>
+                                          </p:spTgt>
+                                        </p:tgtEl>
+                                      </p:cBhvr>
+                                    </p:animEffect>
+                                  </p:childTnLst>
+                                </p:cTn>
+                              </p:par>
+                            </p:childTnLst>
+                          </p:cTn>
+                        </p:par>
+                      </p:childTnLst>
+                    </p:cTn>
+                  </p:par>
+                  <p:par>
+                    <p:cTn id="18" fill="hold">
+                      <p:stCondLst>
+                        <p:cond delay="indefinite"/>
+                      </p:stCondLst>
+                      <p:childTnLst>
+                        <p:par>
+                          <p:cTn id="19" fill="hold">
+                            <p:stCondLst>
+                              <p:cond delay="0"/>
+                            </p:stCondLst>
+                            <p:childTnLst>
+                              <p:par>
+                                <p:cTn id="20" presetID="10" presetClass="entr" presetSubtype="0" fill="hold" grpId="0" nodeType="clickEffect">
+                                  <p:stCondLst>
+                                    <p:cond delay="0"/>
+                                  </p:stCondLst>
+                                  <p:childTnLst>
+                                    <p:set>
+                                      <p:cBhvr>
+                                        <p:cTn id="21" dur="1" fill="hold">
+                                          <p:stCondLst>
+                                            <p:cond delay="0"/>
+                                          </p:stCondLst>
+                                        </p:cTn>
+                                        <p:tgtEl>
+                                          <p:spTgt spid="3">
+                                            <p:txEl>
+                                              <p:pRg st="3" end="3"/>
+                                            </p:txEl>
+                                          </p:spTgt>
+                                        </p:tgtEl>
+                                        <p:attrNameLst>
+                                          <p:attrName>style.visibility</p:attrName>
+                                        </p:attrNameLst>
+                                      </p:cBhvr>
+                                      <p:to>
+                                        <p:strVal val="visible"/>
+                                      </p:to>
+                                    </p:set>
+                                    <p:animEffect transition="in" filter="fade">
+                                      <p:cBhvr>
+                                        <p:cTn id="22" dur="500"/>
+                                        <p:tgtEl>
+                                          <p:spTgt spid="3">
+                                            <p:txEl>
+                                              <p:pRg st="3" end="3"/>
+                                            </p:txEl>
+                                          </p:spTgt>
+                                        </p:tgtEl>
+                                      </p:cBhvr>
+                                    </p:animEffect>
+                                  </p:childTnLst>
+                                </p:cTn>
+                              </p:par>
+                            </p:childTnLst>
+                          </p:cTn>
+                        </p:par>
+                      </p:childTnLst>
+                    </p:cTn>
+                  </p:par>
+                </p:childTnLst>
+              </p:cTn>
+              <p:prevCondLst>
+                <p:cond evt="onPrev" delay="0">
+                  <p:tgtEl>
+                    <p:sldTgt/>
+                  </p:tgtEl>
+                </p:cond>
+              </p:prevCondLst>
+              <p:nextCondLst>
+                <p:cond evt="onNext" delay="0">
+                  <p:tgtEl>
+                    <p:sldTgt/>
+                  </p:tgtEl>
+                </p:cond>
+              </p:nextCondLst>
+            </p:seq>
+          </p:childTnLst>
+        </p:cTn>
+      </p:par>
+    </p:tnLst>
+    <p:bldLst>
+      <p:bldP spid="3" grpId="0" build="p"/>
+    </p:bldLst>
+  </p:timing>
+</p:sld>
+</file>
+
+<file path=ppt/slides/slide20.xml><?xml version="1.0" encoding="utf-8"?>
 <p:sld xmlns:a="http://schemas.openxmlformats.org/drawingml/2006/main" xmlns:r="http://schemas.openxmlformats.org/officeDocument/2006/relationships" xmlns:p="http://schemas.openxmlformats.org/presentationml/2006/main">
   <p:cSld>
     <p:spTree>
@@ -9032,411 +9658,7 @@
 </p:sld>
 </file>
 
-<file path=ppt/slides/slide2.xml><?xml version="1.0" encoding="utf-8"?>
-<p:sld xmlns:a="http://schemas.openxmlformats.org/drawingml/2006/main" xmlns:r="http://schemas.openxmlformats.org/officeDocument/2006/relationships" xmlns:p="http://schemas.openxmlformats.org/presentationml/2006/main">
-  <p:cSld>
-    <p:spTree>
-      <p:nvGrpSpPr>
-        <p:cNvPr id="1" name=""/>
-        <p:cNvGrpSpPr/>
-        <p:nvPr/>
-      </p:nvGrpSpPr>
-      <p:grpSpPr>
-        <a:xfrm>
-          <a:off x="0" y="0"/>
-          <a:ext cx="0" cy="0"/>
-          <a:chOff x="0" y="0"/>
-          <a:chExt cx="0" cy="0"/>
-        </a:xfrm>
-      </p:grpSpPr>
-      <p:sp>
-        <p:nvSpPr>
-          <p:cNvPr id="2" name="Title 1"/>
-          <p:cNvSpPr>
-            <a:spLocks noGrp="1"/>
-          </p:cNvSpPr>
-          <p:nvPr>
-            <p:ph type="title"/>
-          </p:nvPr>
-        </p:nvSpPr>
-        <p:spPr/>
-        <p:txBody>
-          <a:bodyPr/>
-          <a:lstStyle/>
-          <a:p>
-            <a:r>
-              <a:rPr lang="en-US" dirty="0"/>
-              <a:t>Cooperative agents using planning</a:t>
-            </a:r>
-            <a:br>
-              <a:rPr lang="en-US" dirty="0"/>
-            </a:br>
-            <a:br>
-              <a:rPr lang="en-US" dirty="0"/>
-            </a:br>
-            <a:endParaRPr lang="en-US" dirty="0"/>
-          </a:p>
-        </p:txBody>
-      </p:sp>
-      <p:sp>
-        <p:nvSpPr>
-          <p:cNvPr id="3" name="Text Placeholder 2"/>
-          <p:cNvSpPr>
-            <a:spLocks noGrp="1"/>
-          </p:cNvSpPr>
-          <p:nvPr>
-            <p:ph type="body" idx="1"/>
-          </p:nvPr>
-        </p:nvSpPr>
-        <p:spPr/>
-        <p:txBody>
-          <a:bodyPr/>
-          <a:lstStyle/>
-          <a:p>
-            <a:r>
-              <a:rPr lang="en-US" dirty="0">
-                <a:solidFill>
-                  <a:schemeClr val="tx1">
-                    <a:lumMod val="75000"/>
-                    <a:lumOff val="25000"/>
-                  </a:schemeClr>
-                </a:solidFill>
-              </a:rPr>
-              <a:t>Hieratical Planning Or Goal Oriented Action Planning</a:t>
-            </a:r>
-          </a:p>
-          <a:p>
-            <a:r>
-              <a:rPr lang="en-US" dirty="0">
-                <a:solidFill>
-                  <a:schemeClr val="tx1">
-                    <a:lumMod val="75000"/>
-                    <a:lumOff val="25000"/>
-                  </a:schemeClr>
-                </a:solidFill>
-              </a:rPr>
-              <a:t>Demo</a:t>
-            </a:r>
-          </a:p>
-          <a:p>
-            <a:r>
-              <a:rPr lang="en-US" dirty="0">
-                <a:solidFill>
-                  <a:schemeClr val="tx1">
-                    <a:lumMod val="75000"/>
-                    <a:lumOff val="25000"/>
-                  </a:schemeClr>
-                </a:solidFill>
-              </a:rPr>
-              <a:t>How it works</a:t>
-            </a:r>
-          </a:p>
-          <a:p>
-            <a:r>
-              <a:rPr lang="en-US" dirty="0">
-                <a:solidFill>
-                  <a:schemeClr val="tx1">
-                    <a:lumMod val="75000"/>
-                    <a:lumOff val="25000"/>
-                  </a:schemeClr>
-                </a:solidFill>
-              </a:rPr>
-              <a:t>Farther Work</a:t>
-            </a:r>
-          </a:p>
-        </p:txBody>
-      </p:sp>
-    </p:spTree>
-    <p:extLst>
-      <p:ext uri="{BB962C8B-B14F-4D97-AF65-F5344CB8AC3E}">
-        <p14:creationId xmlns:p14="http://schemas.microsoft.com/office/powerpoint/2010/main" val="137745307"/>
-      </p:ext>
-    </p:extLst>
-  </p:cSld>
-  <p:clrMapOvr>
-    <a:masterClrMapping/>
-  </p:clrMapOvr>
-  <p:timing>
-    <p:tnLst>
-      <p:par>
-        <p:cTn id="1" dur="indefinite" restart="never" nodeType="tmRoot">
-          <p:childTnLst>
-            <p:seq concurrent="1" nextAc="seek">
-              <p:cTn id="2" dur="indefinite" nodeType="mainSeq">
-                <p:childTnLst>
-                  <p:par>
-                    <p:cTn id="3" fill="hold">
-                      <p:stCondLst>
-                        <p:cond delay="indefinite"/>
-                      </p:stCondLst>
-                      <p:childTnLst>
-                        <p:par>
-                          <p:cTn id="4" fill="hold">
-                            <p:stCondLst>
-                              <p:cond delay="0"/>
-                            </p:stCondLst>
-                            <p:childTnLst>
-                              <p:par>
-                                <p:cTn id="5" presetID="10" presetClass="entr" presetSubtype="0" fill="hold" grpId="0" nodeType="clickEffect">
-                                  <p:stCondLst>
-                                    <p:cond delay="0"/>
-                                  </p:stCondLst>
-                                  <p:childTnLst>
-                                    <p:set>
-                                      <p:cBhvr>
-                                        <p:cTn id="6" dur="1" fill="hold">
-                                          <p:stCondLst>
-                                            <p:cond delay="0"/>
-                                          </p:stCondLst>
-                                        </p:cTn>
-                                        <p:tgtEl>
-                                          <p:spTgt spid="3">
-                                            <p:txEl>
-                                              <p:pRg st="0" end="0"/>
-                                            </p:txEl>
-                                          </p:spTgt>
-                                        </p:tgtEl>
-                                        <p:attrNameLst>
-                                          <p:attrName>style.visibility</p:attrName>
-                                        </p:attrNameLst>
-                                      </p:cBhvr>
-                                      <p:to>
-                                        <p:strVal val="visible"/>
-                                      </p:to>
-                                    </p:set>
-                                    <p:animEffect transition="in" filter="fade">
-                                      <p:cBhvr>
-                                        <p:cTn id="7" dur="500"/>
-                                        <p:tgtEl>
-                                          <p:spTgt spid="3">
-                                            <p:txEl>
-                                              <p:pRg st="0" end="0"/>
-                                            </p:txEl>
-                                          </p:spTgt>
-                                        </p:tgtEl>
-                                      </p:cBhvr>
-                                    </p:animEffect>
-                                  </p:childTnLst>
-                                </p:cTn>
-                              </p:par>
-                            </p:childTnLst>
-                          </p:cTn>
-                        </p:par>
-                      </p:childTnLst>
-                    </p:cTn>
-                  </p:par>
-                  <p:par>
-                    <p:cTn id="8" fill="hold">
-                      <p:stCondLst>
-                        <p:cond delay="indefinite"/>
-                      </p:stCondLst>
-                      <p:childTnLst>
-                        <p:par>
-                          <p:cTn id="9" fill="hold">
-                            <p:stCondLst>
-                              <p:cond delay="0"/>
-                            </p:stCondLst>
-                            <p:childTnLst>
-                              <p:par>
-                                <p:cTn id="10" presetID="10" presetClass="entr" presetSubtype="0" fill="hold" grpId="0" nodeType="clickEffect">
-                                  <p:stCondLst>
-                                    <p:cond delay="0"/>
-                                  </p:stCondLst>
-                                  <p:childTnLst>
-                                    <p:set>
-                                      <p:cBhvr>
-                                        <p:cTn id="11" dur="1" fill="hold">
-                                          <p:stCondLst>
-                                            <p:cond delay="0"/>
-                                          </p:stCondLst>
-                                        </p:cTn>
-                                        <p:tgtEl>
-                                          <p:spTgt spid="3">
-                                            <p:txEl>
-                                              <p:pRg st="1" end="1"/>
-                                            </p:txEl>
-                                          </p:spTgt>
-                                        </p:tgtEl>
-                                        <p:attrNameLst>
-                                          <p:attrName>style.visibility</p:attrName>
-                                        </p:attrNameLst>
-                                      </p:cBhvr>
-                                      <p:to>
-                                        <p:strVal val="visible"/>
-                                      </p:to>
-                                    </p:set>
-                                    <p:animEffect transition="in" filter="fade">
-                                      <p:cBhvr>
-                                        <p:cTn id="12" dur="500"/>
-                                        <p:tgtEl>
-                                          <p:spTgt spid="3">
-                                            <p:txEl>
-                                              <p:pRg st="1" end="1"/>
-                                            </p:txEl>
-                                          </p:spTgt>
-                                        </p:tgtEl>
-                                      </p:cBhvr>
-                                    </p:animEffect>
-                                  </p:childTnLst>
-                                </p:cTn>
-                              </p:par>
-                            </p:childTnLst>
-                          </p:cTn>
-                        </p:par>
-                      </p:childTnLst>
-                    </p:cTn>
-                  </p:par>
-                  <p:par>
-                    <p:cTn id="13" fill="hold">
-                      <p:stCondLst>
-                        <p:cond delay="indefinite"/>
-                      </p:stCondLst>
-                      <p:childTnLst>
-                        <p:par>
-                          <p:cTn id="14" fill="hold">
-                            <p:stCondLst>
-                              <p:cond delay="0"/>
-                            </p:stCondLst>
-                            <p:childTnLst>
-                              <p:par>
-                                <p:cTn id="15" presetID="10" presetClass="entr" presetSubtype="0" fill="hold" grpId="0" nodeType="clickEffect">
-                                  <p:stCondLst>
-                                    <p:cond delay="0"/>
-                                  </p:stCondLst>
-                                  <p:childTnLst>
-                                    <p:set>
-                                      <p:cBhvr>
-                                        <p:cTn id="16" dur="1" fill="hold">
-                                          <p:stCondLst>
-                                            <p:cond delay="0"/>
-                                          </p:stCondLst>
-                                        </p:cTn>
-                                        <p:tgtEl>
-                                          <p:spTgt spid="3">
-                                            <p:txEl>
-                                              <p:pRg st="2" end="2"/>
-                                            </p:txEl>
-                                          </p:spTgt>
-                                        </p:tgtEl>
-                                        <p:attrNameLst>
-                                          <p:attrName>style.visibility</p:attrName>
-                                        </p:attrNameLst>
-                                      </p:cBhvr>
-                                      <p:to>
-                                        <p:strVal val="visible"/>
-                                      </p:to>
-                                    </p:set>
-                                    <p:animEffect transition="in" filter="fade">
-                                      <p:cBhvr>
-                                        <p:cTn id="17" dur="500"/>
-                                        <p:tgtEl>
-                                          <p:spTgt spid="3">
-                                            <p:txEl>
-                                              <p:pRg st="2" end="2"/>
-                                            </p:txEl>
-                                          </p:spTgt>
-                                        </p:tgtEl>
-                                      </p:cBhvr>
-                                    </p:animEffect>
-                                  </p:childTnLst>
-                                </p:cTn>
-                              </p:par>
-                            </p:childTnLst>
-                          </p:cTn>
-                        </p:par>
-                      </p:childTnLst>
-                    </p:cTn>
-                  </p:par>
-                  <p:par>
-                    <p:cTn id="18" fill="hold">
-                      <p:stCondLst>
-                        <p:cond delay="indefinite"/>
-                      </p:stCondLst>
-                      <p:childTnLst>
-                        <p:par>
-                          <p:cTn id="19" fill="hold">
-                            <p:stCondLst>
-                              <p:cond delay="0"/>
-                            </p:stCondLst>
-                            <p:childTnLst>
-                              <p:par>
-                                <p:cTn id="20" presetID="10" presetClass="entr" presetSubtype="0" fill="hold" grpId="0" nodeType="clickEffect">
-                                  <p:stCondLst>
-                                    <p:cond delay="0"/>
-                                  </p:stCondLst>
-                                  <p:childTnLst>
-                                    <p:set>
-                                      <p:cBhvr>
-                                        <p:cTn id="21" dur="1" fill="hold">
-                                          <p:stCondLst>
-                                            <p:cond delay="0"/>
-                                          </p:stCondLst>
-                                        </p:cTn>
-                                        <p:tgtEl>
-                                          <p:spTgt spid="3">
-                                            <p:txEl>
-                                              <p:pRg st="3" end="3"/>
-                                            </p:txEl>
-                                          </p:spTgt>
-                                        </p:tgtEl>
-                                        <p:attrNameLst>
-                                          <p:attrName>style.visibility</p:attrName>
-                                        </p:attrNameLst>
-                                      </p:cBhvr>
-                                      <p:to>
-                                        <p:strVal val="visible"/>
-                                      </p:to>
-                                    </p:set>
-                                    <p:animEffect transition="in" filter="fade">
-                                      <p:cBhvr>
-                                        <p:cTn id="22" dur="500"/>
-                                        <p:tgtEl>
-                                          <p:spTgt spid="3">
-                                            <p:txEl>
-                                              <p:pRg st="3" end="3"/>
-                                            </p:txEl>
-                                          </p:spTgt>
-                                        </p:tgtEl>
-                                      </p:cBhvr>
-                                    </p:animEffect>
-                                  </p:childTnLst>
-                                </p:cTn>
-                              </p:par>
-                            </p:childTnLst>
-                          </p:cTn>
-                        </p:par>
-                      </p:childTnLst>
-                    </p:cTn>
-                  </p:par>
-                </p:childTnLst>
-              </p:cTn>
-              <p:prevCondLst>
-                <p:cond evt="onPrev" delay="0">
-                  <p:tgtEl>
-                    <p:sldTgt/>
-                  </p:tgtEl>
-                </p:cond>
-              </p:prevCondLst>
-              <p:nextCondLst>
-                <p:cond evt="onNext" delay="0">
-                  <p:tgtEl>
-                    <p:sldTgt/>
-                  </p:tgtEl>
-                </p:cond>
-              </p:nextCondLst>
-            </p:seq>
-          </p:childTnLst>
-        </p:cTn>
-      </p:par>
-    </p:tnLst>
-    <p:bldLst>
-      <p:bldP spid="3" grpId="0" build="p"/>
-    </p:bldLst>
-  </p:timing>
-</p:sld>
-</file>
-
-<file path=ppt/slides/slide20.xml><?xml version="1.0" encoding="utf-8"?>
+<file path=ppt/slides/slide21.xml><?xml version="1.0" encoding="utf-8"?>
 <p:sld xmlns:a="http://schemas.openxmlformats.org/drawingml/2006/main" xmlns:r="http://schemas.openxmlformats.org/officeDocument/2006/relationships" xmlns:p="http://schemas.openxmlformats.org/presentationml/2006/main">
   <p:cSld>
     <p:spTree>
@@ -9603,7 +9825,7 @@
 </p:sld>
 </file>
 
-<file path=ppt/slides/slide21.xml><?xml version="1.0" encoding="utf-8"?>
+<file path=ppt/slides/slide22.xml><?xml version="1.0" encoding="utf-8"?>
 <p:sld xmlns:a="http://schemas.openxmlformats.org/drawingml/2006/main" xmlns:r="http://schemas.openxmlformats.org/officeDocument/2006/relationships" xmlns:p="http://schemas.openxmlformats.org/presentationml/2006/main">
   <p:cSld>
     <p:spTree>
@@ -9746,7 +9968,7 @@
 </p:sld>
 </file>
 
-<file path=ppt/slides/slide22.xml><?xml version="1.0" encoding="utf-8"?>
+<file path=ppt/slides/slide23.xml><?xml version="1.0" encoding="utf-8"?>
 <p:sld xmlns:a="http://schemas.openxmlformats.org/drawingml/2006/main" xmlns:r="http://schemas.openxmlformats.org/officeDocument/2006/relationships" xmlns:p="http://schemas.openxmlformats.org/presentationml/2006/main">
   <p:cSld>
     <p:spTree>
@@ -12306,7 +12528,7 @@
 </p:sld>
 </file>
 
-<file path=ppt/slides/slide23.xml><?xml version="1.0" encoding="utf-8"?>
+<file path=ppt/slides/slide24.xml><?xml version="1.0" encoding="utf-8"?>
 <p:sld xmlns:a="http://schemas.openxmlformats.org/drawingml/2006/main" xmlns:r="http://schemas.openxmlformats.org/officeDocument/2006/relationships" xmlns:p="http://schemas.openxmlformats.org/presentationml/2006/main">
   <p:cSld>
     <p:spTree>
@@ -12519,7 +12741,7 @@
 </p:sld>
 </file>
 
-<file path=ppt/slides/slide24.xml><?xml version="1.0" encoding="utf-8"?>
+<file path=ppt/slides/slide25.xml><?xml version="1.0" encoding="utf-8"?>
 <p:sld xmlns:a="http://schemas.openxmlformats.org/drawingml/2006/main" xmlns:r="http://schemas.openxmlformats.org/officeDocument/2006/relationships" xmlns:p="http://schemas.openxmlformats.org/presentationml/2006/main">
   <p:cSld>
     <p:spTree>
@@ -12723,58 +12945,6 @@
     <p:extLst>
       <p:ext uri="{BB962C8B-B14F-4D97-AF65-F5344CB8AC3E}">
         <p14:creationId xmlns:p14="http://schemas.microsoft.com/office/powerpoint/2010/main" val="2898168172"/>
-      </p:ext>
-    </p:extLst>
-  </p:cSld>
-  <p:clrMapOvr>
-    <a:masterClrMapping/>
-  </p:clrMapOvr>
-</p:sld>
-</file>
-
-<file path=ppt/slides/slide25.xml><?xml version="1.0" encoding="utf-8"?>
-<p:sld xmlns:a="http://schemas.openxmlformats.org/drawingml/2006/main" xmlns:r="http://schemas.openxmlformats.org/officeDocument/2006/relationships" xmlns:p="http://schemas.openxmlformats.org/presentationml/2006/main">
-  <p:cSld>
-    <p:spTree>
-      <p:nvGrpSpPr>
-        <p:cNvPr id="1" name=""/>
-        <p:cNvGrpSpPr/>
-        <p:nvPr/>
-      </p:nvGrpSpPr>
-      <p:grpSpPr>
-        <a:xfrm>
-          <a:off x="0" y="0"/>
-          <a:ext cx="0" cy="0"/>
-          <a:chOff x="0" y="0"/>
-          <a:chExt cx="0" cy="0"/>
-        </a:xfrm>
-      </p:grpSpPr>
-      <p:sp>
-        <p:nvSpPr>
-          <p:cNvPr id="2" name="Title 1"/>
-          <p:cNvSpPr>
-            <a:spLocks noGrp="1"/>
-          </p:cNvSpPr>
-          <p:nvPr>
-            <p:ph type="ctrTitle"/>
-          </p:nvPr>
-        </p:nvSpPr>
-        <p:spPr/>
-        <p:txBody>
-          <a:bodyPr/>
-          <a:lstStyle/>
-          <a:p>
-            <a:r>
-              <a:rPr lang="en-US" dirty="0"/>
-              <a:t>Questions/Comments</a:t>
-            </a:r>
-          </a:p>
-        </p:txBody>
-      </p:sp>
-    </p:spTree>
-    <p:extLst>
-      <p:ext uri="{BB962C8B-B14F-4D97-AF65-F5344CB8AC3E}">
-        <p14:creationId xmlns:p14="http://schemas.microsoft.com/office/powerpoint/2010/main" val="2331009622"/>
       </p:ext>
     </p:extLst>
   </p:cSld>

</xml_diff>